<commit_message>
testing pynite combine with gpyopt, update logbook
</commit_message>
<xml_diff>
--- a/Michaelmas Presenation.pptx
+++ b/Michaelmas Presenation.pptx
@@ -5,7 +5,7 @@
     <p:sldMasterId id="2147484093" r:id="rId1"/>
   </p:sldMasterIdLst>
   <p:notesMasterIdLst>
-    <p:notesMasterId r:id="rId10"/>
+    <p:notesMasterId r:id="rId12"/>
   </p:notesMasterIdLst>
   <p:sldIdLst>
     <p:sldId id="256" r:id="rId2"/>
@@ -13,9 +13,11 @@
     <p:sldId id="264" r:id="rId4"/>
     <p:sldId id="263" r:id="rId5"/>
     <p:sldId id="258" r:id="rId6"/>
-    <p:sldId id="261" r:id="rId7"/>
-    <p:sldId id="265" r:id="rId8"/>
-    <p:sldId id="262" r:id="rId9"/>
+    <p:sldId id="267" r:id="rId7"/>
+    <p:sldId id="261" r:id="rId8"/>
+    <p:sldId id="265" r:id="rId9"/>
+    <p:sldId id="266" r:id="rId10"/>
+    <p:sldId id="262" r:id="rId11"/>
   </p:sldIdLst>
   <p:sldSz cx="12192000" cy="6858000"/>
   <p:notesSz cx="6858000" cy="9144000"/>
@@ -204,7 +206,7 @@
           <a:p>
             <a:fld id="{D06EE488-76A6-BE46-8D6F-F46FA021F807}" type="datetimeFigureOut">
               <a:rPr lang="en-GB" smtClean="0"/>
-              <a:t>11/11/2020</a:t>
+              <a:t>21/11/2020</a:t>
             </a:fld>
             <a:endParaRPr lang="en-GB"/>
           </a:p>
@@ -612,6 +614,116 @@
 </p:notes>
 </file>
 
+<file path=ppt/notesSlides/notesSlide10.xml><?xml version="1.0" encoding="utf-8"?>
+<p:notes xmlns:a="http://schemas.openxmlformats.org/drawingml/2006/main" xmlns:r="http://schemas.openxmlformats.org/officeDocument/2006/relationships" xmlns:p="http://schemas.openxmlformats.org/presentationml/2006/main">
+  <p:cSld>
+    <p:spTree>
+      <p:nvGrpSpPr>
+        <p:cNvPr id="1" name=""/>
+        <p:cNvGrpSpPr/>
+        <p:nvPr/>
+      </p:nvGrpSpPr>
+      <p:grpSpPr>
+        <a:xfrm>
+          <a:off x="0" y="0"/>
+          <a:ext cx="0" cy="0"/>
+          <a:chOff x="0" y="0"/>
+          <a:chExt cx="0" cy="0"/>
+        </a:xfrm>
+      </p:grpSpPr>
+      <p:sp>
+        <p:nvSpPr>
+          <p:cNvPr id="2" name="Slide Image Placeholder 1"/>
+          <p:cNvSpPr>
+            <a:spLocks noGrp="1" noRot="1" noChangeAspect="1"/>
+          </p:cNvSpPr>
+          <p:nvPr>
+            <p:ph type="sldImg"/>
+          </p:nvPr>
+        </p:nvSpPr>
+        <p:spPr/>
+      </p:sp>
+      <p:sp>
+        <p:nvSpPr>
+          <p:cNvPr id="3" name="Notes Placeholder 2"/>
+          <p:cNvSpPr>
+            <a:spLocks noGrp="1"/>
+          </p:cNvSpPr>
+          <p:nvPr>
+            <p:ph type="body" idx="1"/>
+          </p:nvPr>
+        </p:nvSpPr>
+        <p:spPr/>
+        <p:txBody>
+          <a:bodyPr/>
+          <a:lstStyle/>
+          <a:p>
+            <a:r>
+              <a:rPr lang="en-GB" dirty="0"/>
+              <a:t>Aim: explore how Bayesian optimisation can be applied on structural optimisation problems using Gaussian Process models trained on FEM data.</a:t>
+            </a:r>
+          </a:p>
+          <a:p>
+            <a:r>
+              <a:rPr lang="en-GB" dirty="0"/>
+              <a:t>Some conclusions so far – non-convex functions get much bigger errors (but this is to be expected, more local minima to get stuck in)</a:t>
+            </a:r>
+          </a:p>
+          <a:p>
+            <a:pPr marL="171450" indent="-171450">
+              <a:buFontTx/>
+              <a:buChar char="-"/>
+            </a:pPr>
+            <a:r>
+              <a:rPr lang="en-GB" dirty="0"/>
+              <a:t>Sparse GP good for when initially given lots of data points but not for using acquisition function to get more points – probably estimations stacking</a:t>
+            </a:r>
+          </a:p>
+          <a:p>
+            <a:pPr marL="171450" indent="-171450">
+              <a:buFontTx/>
+              <a:buChar char="-"/>
+            </a:pPr>
+            <a:endParaRPr lang="en-GB" dirty="0"/>
+          </a:p>
+        </p:txBody>
+      </p:sp>
+      <p:sp>
+        <p:nvSpPr>
+          <p:cNvPr id="4" name="Slide Number Placeholder 3"/>
+          <p:cNvSpPr>
+            <a:spLocks noGrp="1"/>
+          </p:cNvSpPr>
+          <p:nvPr>
+            <p:ph type="sldNum" sz="quarter" idx="5"/>
+          </p:nvPr>
+        </p:nvSpPr>
+        <p:spPr/>
+        <p:txBody>
+          <a:bodyPr/>
+          <a:lstStyle/>
+          <a:p>
+            <a:fld id="{87D6E53E-8426-0E4E-975A-4A143A8DCEB2}" type="slidenum">
+              <a:rPr lang="en-GB" smtClean="0"/>
+              <a:t>10</a:t>
+            </a:fld>
+            <a:endParaRPr lang="en-GB"/>
+          </a:p>
+        </p:txBody>
+      </p:sp>
+    </p:spTree>
+    <p:extLst>
+      <p:ext uri="{BB962C8B-B14F-4D97-AF65-F5344CB8AC3E}">
+        <p14:creationId xmlns:p14="http://schemas.microsoft.com/office/powerpoint/2010/main" val="3778471988"/>
+      </p:ext>
+    </p:extLst>
+  </p:cSld>
+  <p:clrMapOvr>
+    <a:masterClrMapping/>
+  </p:clrMapOvr>
+</p:notes>
+</file>
+
 <file path=ppt/notesSlides/notesSlide2.xml><?xml version="1.0" encoding="utf-8"?>
 <p:notes xmlns:a="http://schemas.openxmlformats.org/drawingml/2006/main" xmlns:r="http://schemas.openxmlformats.org/officeDocument/2006/relationships" xmlns:p="http://schemas.openxmlformats.org/presentationml/2006/main">
   <p:cSld>
@@ -655,6 +767,21 @@
         <p:txBody>
           <a:bodyPr/>
           <a:lstStyle/>
+          <a:p>
+            <a:r>
+              <a:rPr lang="en-GB" dirty="0"/>
+              <a:t>Have FEM, engineering models, hand made models – things are non-linear/intractable can’t just take derivatives (convention)</a:t>
+            </a:r>
+          </a:p>
+          <a:p>
+            <a:r>
+              <a:rPr lang="en-GB" dirty="0"/>
+              <a:t>Data-driven approach instead of just taking derivatives</a:t>
+            </a:r>
+          </a:p>
+          <a:p>
+            <a:endParaRPr lang="en-GB" dirty="0"/>
+          </a:p>
           <a:p>
             <a:endParaRPr lang="en-GB" dirty="0"/>
           </a:p>
@@ -861,9 +988,49 @@
           <a:bodyPr/>
           <a:lstStyle/>
           <a:p>
+            <a:pPr marL="0" marR="0" lvl="0" indent="0" algn="l" defTabSz="914400" rtl="0" eaLnBrk="1" fontAlgn="auto" latinLnBrk="0" hangingPunct="1">
+              <a:lnSpc>
+                <a:spcPct val="100000"/>
+              </a:lnSpc>
+              <a:spcBef>
+                <a:spcPts val="0"/>
+              </a:spcBef>
+              <a:spcAft>
+                <a:spcPts val="0"/>
+              </a:spcAft>
+              <a:buClrTx/>
+              <a:buSzTx/>
+              <a:buFontTx/>
+              <a:buNone/>
+              <a:tabLst/>
+              <a:defRPr/>
+            </a:pPr>
             <a:r>
               <a:rPr lang="en-GB" dirty="0"/>
-              <a:t>Finite element model example</a:t>
+              <a:t>Finite element model example – 5 years time</a:t>
+            </a:r>
+          </a:p>
+          <a:p>
+            <a:pPr marL="0" marR="0" lvl="0" indent="0" algn="l" defTabSz="914400" rtl="0" eaLnBrk="1" fontAlgn="auto" latinLnBrk="0" hangingPunct="1">
+              <a:lnSpc>
+                <a:spcPct val="100000"/>
+              </a:lnSpc>
+              <a:spcBef>
+                <a:spcPts val="0"/>
+              </a:spcBef>
+              <a:spcAft>
+                <a:spcPts val="0"/>
+              </a:spcAft>
+              <a:buClrTx/>
+              <a:buSzTx/>
+              <a:buFontTx/>
+              <a:buNone/>
+              <a:tabLst/>
+              <a:defRPr/>
+            </a:pPr>
+            <a:r>
+              <a:rPr lang="en-GB" dirty="0"/>
+              <a:t>Jet engine model – can use this technique to find optimal angle/shape of turbine fins, minimising material weight and keeping stresses within some limits</a:t>
             </a:r>
           </a:p>
         </p:txBody>
@@ -973,7 +1140,7 @@
           <a:p>
             <a:r>
               <a:rPr lang="en-GB" dirty="0"/>
-              <a:t>Acquisition function balances exploration and exploitation</a:t>
+              <a:t>Bayesian optimisation part - Acquisition function balances exploration and exploitation</a:t>
             </a:r>
           </a:p>
         </p:txBody>
@@ -1060,7 +1227,7 @@
           <a:p>
             <a:r>
               <a:rPr lang="en-GB" dirty="0"/>
-              <a:t>Posterior of the Gaussian process</a:t>
+              <a:t>GP optimisation testing that I did</a:t>
             </a:r>
           </a:p>
         </p:txBody>
@@ -1091,7 +1258,7 @@
     </p:spTree>
     <p:extLst>
       <p:ext uri="{BB962C8B-B14F-4D97-AF65-F5344CB8AC3E}">
-        <p14:creationId xmlns:p14="http://schemas.microsoft.com/office/powerpoint/2010/main" val="4104965006"/>
+        <p14:creationId xmlns:p14="http://schemas.microsoft.com/office/powerpoint/2010/main" val="3233681164"/>
       </p:ext>
     </p:extLst>
   </p:cSld>
@@ -1145,7 +1312,128 @@
           <a:bodyPr/>
           <a:lstStyle/>
           <a:p>
+            <a:r>
+              <a:rPr lang="en-GB" dirty="0"/>
+              <a:t>Posterior of the Gaussian process</a:t>
+            </a:r>
+          </a:p>
+          <a:p>
+            <a:r>
+              <a:rPr lang="en-GB" dirty="0"/>
+              <a:t>calculating each point takes very long time when FEM models complex and large</a:t>
+            </a:r>
+          </a:p>
+          <a:p>
+            <a:r>
+              <a:rPr lang="en-GB" dirty="0"/>
+              <a:t>Sparse GP:</a:t>
+            </a:r>
+          </a:p>
+          <a:p>
+            <a:pPr marL="0" marR="0" lvl="0" indent="0" algn="l" defTabSz="914400" rtl="0" eaLnBrk="1" fontAlgn="auto" latinLnBrk="0" hangingPunct="1">
+              <a:lnSpc>
+                <a:spcPct val="100000"/>
+              </a:lnSpc>
+              <a:spcBef>
+                <a:spcPts val="0"/>
+              </a:spcBef>
+              <a:spcAft>
+                <a:spcPts val="0"/>
+              </a:spcAft>
+              <a:buClrTx/>
+              <a:buSzTx/>
+              <a:buFontTx/>
+              <a:buNone/>
+              <a:tabLst/>
+              <a:defRPr/>
+            </a:pPr>
+            <a:r>
+              <a:rPr lang="en-US" sz="1200" dirty="0"/>
+              <a:t>Can </a:t>
+            </a:r>
+            <a:r>
+              <a:rPr lang="en-US" sz="1200" dirty="0" err="1"/>
+              <a:t>optimise</a:t>
+            </a:r>
+            <a:r>
+              <a:rPr lang="en-US" sz="1200" dirty="0"/>
+              <a:t> for where these pseudo-data are to get best approximate posterior distribution</a:t>
+            </a:r>
+          </a:p>
+          <a:p>
+            <a:pPr marL="0" marR="0" lvl="0" indent="0" algn="l" defTabSz="914400" rtl="0" eaLnBrk="1" fontAlgn="auto" latinLnBrk="0" hangingPunct="1">
+              <a:lnSpc>
+                <a:spcPct val="100000"/>
+              </a:lnSpc>
+              <a:spcBef>
+                <a:spcPts val="0"/>
+              </a:spcBef>
+              <a:spcAft>
+                <a:spcPts val="0"/>
+              </a:spcAft>
+              <a:buClrTx/>
+              <a:buSzTx/>
+              <a:buFontTx/>
+              <a:buNone/>
+              <a:tabLst/>
+              <a:defRPr/>
+            </a:pPr>
+            <a:endParaRPr lang="en-US" sz="1200" dirty="0"/>
+          </a:p>
+          <a:p>
+            <a:pPr marL="0" marR="0" lvl="0" indent="0" algn="l" defTabSz="914400" rtl="0" eaLnBrk="1" fontAlgn="auto" latinLnBrk="0" hangingPunct="1">
+              <a:lnSpc>
+                <a:spcPct val="100000"/>
+              </a:lnSpc>
+              <a:spcBef>
+                <a:spcPts val="0"/>
+              </a:spcBef>
+              <a:spcAft>
+                <a:spcPts val="0"/>
+              </a:spcAft>
+              <a:buClrTx/>
+              <a:buSzTx/>
+              <a:buFontTx/>
+              <a:buNone/>
+              <a:tabLst/>
+              <a:defRPr/>
+            </a:pPr>
+            <a:r>
+              <a:rPr lang="en-US" sz="1200" dirty="0"/>
+              <a:t>Multi-fidelity GP:</a:t>
+            </a:r>
+          </a:p>
+          <a:p>
+            <a:pPr marL="0" marR="0" lvl="0" indent="0" algn="l" defTabSz="914400" rtl="0" eaLnBrk="1" fontAlgn="auto" latinLnBrk="0" hangingPunct="1">
+              <a:lnSpc>
+                <a:spcPct val="100000"/>
+              </a:lnSpc>
+              <a:spcBef>
+                <a:spcPts val="0"/>
+              </a:spcBef>
+              <a:spcAft>
+                <a:spcPts val="0"/>
+              </a:spcAft>
+              <a:buClrTx/>
+              <a:buSzTx/>
+              <a:buFontTx/>
+              <a:buNone/>
+              <a:tabLst/>
+              <a:defRPr/>
+            </a:pPr>
+            <a:r>
+              <a:rPr lang="en-US" sz="1200" dirty="0"/>
+              <a:t>Low fidelity GP model, related high fidelity GP model, combine training – joint </a:t>
+            </a:r>
+          </a:p>
+          <a:p>
             <a:endParaRPr lang="en-GB" dirty="0"/>
+          </a:p>
+          <a:p>
+            <a:r>
+              <a:rPr lang="en-GB" dirty="0"/>
+              <a:t>Different approaches to handle high-dimensional space, large calculations</a:t>
+            </a:r>
           </a:p>
         </p:txBody>
       </p:sp>
@@ -1175,7 +1463,7 @@
     </p:spTree>
     <p:extLst>
       <p:ext uri="{BB962C8B-B14F-4D97-AF65-F5344CB8AC3E}">
-        <p14:creationId xmlns:p14="http://schemas.microsoft.com/office/powerpoint/2010/main" val="3142472496"/>
+        <p14:creationId xmlns:p14="http://schemas.microsoft.com/office/powerpoint/2010/main" val="4104965006"/>
       </p:ext>
     </p:extLst>
   </p:cSld>
@@ -1231,31 +1519,8 @@
           <a:p>
             <a:r>
               <a:rPr lang="en-GB" dirty="0"/>
-              <a:t>Aim: explore how Bayesian optimisation can be applied on structural optimisation problems using Gaussian Process models trained on FEM data.</a:t>
-            </a:r>
-          </a:p>
-          <a:p>
-            <a:r>
-              <a:rPr lang="en-GB" dirty="0"/>
-              <a:t>Some conclusions so far – non-convex functions get much bigger errors (but this is to be expected, more local minima to get stuck in)</a:t>
-            </a:r>
-          </a:p>
-          <a:p>
-            <a:pPr marL="171450" indent="-171450">
-              <a:buFontTx/>
-              <a:buChar char="-"/>
-            </a:pPr>
-            <a:r>
-              <a:rPr lang="en-GB" dirty="0"/>
-              <a:t>Sparse GP good for when initially given lots of data points but not for using acquisition function to get more points – probably estimations stacking</a:t>
-            </a:r>
-          </a:p>
-          <a:p>
-            <a:pPr marL="171450" indent="-171450">
-              <a:buFontTx/>
-              <a:buChar char="-"/>
-            </a:pPr>
-            <a:endParaRPr lang="en-GB" dirty="0"/>
+              <a:t>Sparse GP</a:t>
+            </a:r>
           </a:p>
         </p:txBody>
       </p:sp>
@@ -1285,7 +1550,94 @@
     </p:spTree>
     <p:extLst>
       <p:ext uri="{BB962C8B-B14F-4D97-AF65-F5344CB8AC3E}">
-        <p14:creationId xmlns:p14="http://schemas.microsoft.com/office/powerpoint/2010/main" val="3778471988"/>
+        <p14:creationId xmlns:p14="http://schemas.microsoft.com/office/powerpoint/2010/main" val="3142472496"/>
+      </p:ext>
+    </p:extLst>
+  </p:cSld>
+  <p:clrMapOvr>
+    <a:masterClrMapping/>
+  </p:clrMapOvr>
+</p:notes>
+</file>
+
+<file path=ppt/notesSlides/notesSlide9.xml><?xml version="1.0" encoding="utf-8"?>
+<p:notes xmlns:a="http://schemas.openxmlformats.org/drawingml/2006/main" xmlns:r="http://schemas.openxmlformats.org/officeDocument/2006/relationships" xmlns:p="http://schemas.openxmlformats.org/presentationml/2006/main">
+  <p:cSld>
+    <p:spTree>
+      <p:nvGrpSpPr>
+        <p:cNvPr id="1" name=""/>
+        <p:cNvGrpSpPr/>
+        <p:nvPr/>
+      </p:nvGrpSpPr>
+      <p:grpSpPr>
+        <a:xfrm>
+          <a:off x="0" y="0"/>
+          <a:ext cx="0" cy="0"/>
+          <a:chOff x="0" y="0"/>
+          <a:chExt cx="0" cy="0"/>
+        </a:xfrm>
+      </p:grpSpPr>
+      <p:sp>
+        <p:nvSpPr>
+          <p:cNvPr id="2" name="Slide Image Placeholder 1"/>
+          <p:cNvSpPr>
+            <a:spLocks noGrp="1" noRot="1" noChangeAspect="1"/>
+          </p:cNvSpPr>
+          <p:nvPr>
+            <p:ph type="sldImg"/>
+          </p:nvPr>
+        </p:nvSpPr>
+        <p:spPr/>
+      </p:sp>
+      <p:sp>
+        <p:nvSpPr>
+          <p:cNvPr id="3" name="Notes Placeholder 2"/>
+          <p:cNvSpPr>
+            <a:spLocks noGrp="1"/>
+          </p:cNvSpPr>
+          <p:nvPr>
+            <p:ph type="body" idx="1"/>
+          </p:nvPr>
+        </p:nvSpPr>
+        <p:spPr/>
+        <p:txBody>
+          <a:bodyPr/>
+          <a:lstStyle/>
+          <a:p>
+            <a:r>
+              <a:rPr lang="en-GB" dirty="0"/>
+              <a:t>Multi-fidelity GP</a:t>
+            </a:r>
+          </a:p>
+        </p:txBody>
+      </p:sp>
+      <p:sp>
+        <p:nvSpPr>
+          <p:cNvPr id="4" name="Slide Number Placeholder 3"/>
+          <p:cNvSpPr>
+            <a:spLocks noGrp="1"/>
+          </p:cNvSpPr>
+          <p:nvPr>
+            <p:ph type="sldNum" sz="quarter" idx="5"/>
+          </p:nvPr>
+        </p:nvSpPr>
+        <p:spPr/>
+        <p:txBody>
+          <a:bodyPr/>
+          <a:lstStyle/>
+          <a:p>
+            <a:fld id="{87D6E53E-8426-0E4E-975A-4A143A8DCEB2}" type="slidenum">
+              <a:rPr lang="en-GB" smtClean="0"/>
+              <a:t>9</a:t>
+            </a:fld>
+            <a:endParaRPr lang="en-GB"/>
+          </a:p>
+        </p:txBody>
+      </p:sp>
+    </p:spTree>
+    <p:extLst>
+      <p:ext uri="{BB962C8B-B14F-4D97-AF65-F5344CB8AC3E}">
+        <p14:creationId xmlns:p14="http://schemas.microsoft.com/office/powerpoint/2010/main" val="4257190783"/>
       </p:ext>
     </p:extLst>
   </p:cSld>
@@ -1465,7 +1817,7 @@
           <a:p>
             <a:fld id="{75A6CA30-8F9C-5C44-B8C9-9A98D08A952F}" type="datetimeFigureOut">
               <a:rPr lang="en-US" smtClean="0"/>
-              <a:t>11/11/20</a:t>
+              <a:t>11/21/20</a:t>
             </a:fld>
             <a:endParaRPr lang="en-US"/>
           </a:p>
@@ -1732,7 +2084,7 @@
           <a:p>
             <a:fld id="{75A6CA30-8F9C-5C44-B8C9-9A98D08A952F}" type="datetimeFigureOut">
               <a:rPr lang="en-US" smtClean="0"/>
-              <a:t>11/11/20</a:t>
+              <a:t>11/21/20</a:t>
             </a:fld>
             <a:endParaRPr lang="en-US"/>
           </a:p>
@@ -1963,7 +2315,7 @@
           <a:p>
             <a:fld id="{75A6CA30-8F9C-5C44-B8C9-9A98D08A952F}" type="datetimeFigureOut">
               <a:rPr lang="en-US" smtClean="0"/>
-              <a:t>11/11/20</a:t>
+              <a:t>11/21/20</a:t>
             </a:fld>
             <a:endParaRPr lang="en-US"/>
           </a:p>
@@ -2273,7 +2625,7 @@
           <a:p>
             <a:fld id="{75A6CA30-8F9C-5C44-B8C9-9A98D08A952F}" type="datetimeFigureOut">
               <a:rPr lang="en-US" smtClean="0"/>
-              <a:t>11/11/20</a:t>
+              <a:t>11/21/20</a:t>
             </a:fld>
             <a:endParaRPr lang="en-US"/>
           </a:p>
@@ -2746,7 +3098,7 @@
           <a:p>
             <a:fld id="{75A6CA30-8F9C-5C44-B8C9-9A98D08A952F}" type="datetimeFigureOut">
               <a:rPr lang="en-US" smtClean="0"/>
-              <a:t>11/11/20</a:t>
+              <a:t>11/21/20</a:t>
             </a:fld>
             <a:endParaRPr lang="en-US"/>
           </a:p>
@@ -3293,7 +3645,7 @@
           <a:p>
             <a:fld id="{75A6CA30-8F9C-5C44-B8C9-9A98D08A952F}" type="datetimeFigureOut">
               <a:rPr lang="en-US" smtClean="0"/>
-              <a:t>11/11/20</a:t>
+              <a:t>11/21/20</a:t>
             </a:fld>
             <a:endParaRPr lang="en-US"/>
           </a:p>
@@ -4067,7 +4419,7 @@
           <a:p>
             <a:fld id="{75A6CA30-8F9C-5C44-B8C9-9A98D08A952F}" type="datetimeFigureOut">
               <a:rPr lang="en-US" smtClean="0"/>
-              <a:t>11/11/20</a:t>
+              <a:t>11/21/20</a:t>
             </a:fld>
             <a:endParaRPr lang="en-US"/>
           </a:p>
@@ -4242,7 +4594,7 @@
           <a:p>
             <a:fld id="{75A6CA30-8F9C-5C44-B8C9-9A98D08A952F}" type="datetimeFigureOut">
               <a:rPr lang="en-US" smtClean="0"/>
-              <a:t>11/11/20</a:t>
+              <a:t>11/21/20</a:t>
             </a:fld>
             <a:endParaRPr lang="en-US"/>
           </a:p>
@@ -4465,7 +4817,7 @@
           <a:p>
             <a:fld id="{75A6CA30-8F9C-5C44-B8C9-9A98D08A952F}" type="datetimeFigureOut">
               <a:rPr lang="en-US" smtClean="0"/>
-              <a:t>11/11/20</a:t>
+              <a:t>11/21/20</a:t>
             </a:fld>
             <a:endParaRPr lang="en-US"/>
           </a:p>
@@ -4886,7 +5238,7 @@
           <a:p>
             <a:fld id="{75A6CA30-8F9C-5C44-B8C9-9A98D08A952F}" type="datetimeFigureOut">
               <a:rPr lang="en-US" smtClean="0"/>
-              <a:t>11/11/20</a:t>
+              <a:t>11/21/20</a:t>
             </a:fld>
             <a:endParaRPr lang="en-US"/>
           </a:p>
@@ -5079,7 +5431,7 @@
           <a:p>
             <a:fld id="{75A6CA30-8F9C-5C44-B8C9-9A98D08A952F}" type="datetimeFigureOut">
               <a:rPr lang="en-US" smtClean="0"/>
-              <a:t>11/11/20</a:t>
+              <a:t>11/21/20</a:t>
             </a:fld>
             <a:endParaRPr lang="en-US"/>
           </a:p>
@@ -5368,7 +5720,7 @@
           <a:p>
             <a:fld id="{75A6CA30-8F9C-5C44-B8C9-9A98D08A952F}" type="datetimeFigureOut">
               <a:rPr lang="en-US" smtClean="0"/>
-              <a:t>11/11/20</a:t>
+              <a:t>11/21/20</a:t>
             </a:fld>
             <a:endParaRPr lang="en-US"/>
           </a:p>
@@ -5610,7 +5962,7 @@
           <a:p>
             <a:fld id="{75A6CA30-8F9C-5C44-B8C9-9A98D08A952F}" type="datetimeFigureOut">
               <a:rPr lang="en-US" smtClean="0"/>
-              <a:t>11/11/20</a:t>
+              <a:t>11/21/20</a:t>
             </a:fld>
             <a:endParaRPr lang="en-US"/>
           </a:p>
@@ -5989,7 +6341,7 @@
           <a:p>
             <a:fld id="{75A6CA30-8F9C-5C44-B8C9-9A98D08A952F}" type="datetimeFigureOut">
               <a:rPr lang="en-US" smtClean="0"/>
-              <a:t>11/11/20</a:t>
+              <a:t>11/21/20</a:t>
             </a:fld>
             <a:endParaRPr lang="en-US"/>
           </a:p>
@@ -6107,7 +6459,7 @@
           <a:p>
             <a:fld id="{75A6CA30-8F9C-5C44-B8C9-9A98D08A952F}" type="datetimeFigureOut">
               <a:rPr lang="en-US" smtClean="0"/>
-              <a:t>11/11/20</a:t>
+              <a:t>11/21/20</a:t>
             </a:fld>
             <a:endParaRPr lang="en-US"/>
           </a:p>
@@ -6202,7 +6554,7 @@
           <a:p>
             <a:fld id="{75A6CA30-8F9C-5C44-B8C9-9A98D08A952F}" type="datetimeFigureOut">
               <a:rPr lang="en-US" smtClean="0"/>
-              <a:t>11/11/20</a:t>
+              <a:t>11/21/20</a:t>
             </a:fld>
             <a:endParaRPr lang="en-US"/>
           </a:p>
@@ -6451,7 +6803,7 @@
           <a:p>
             <a:fld id="{75A6CA30-8F9C-5C44-B8C9-9A98D08A952F}" type="datetimeFigureOut">
               <a:rPr lang="en-US" smtClean="0"/>
-              <a:t>11/11/20</a:t>
+              <a:t>11/21/20</a:t>
             </a:fld>
             <a:endParaRPr lang="en-US"/>
           </a:p>
@@ -6708,7 +7060,7 @@
           <a:p>
             <a:fld id="{75A6CA30-8F9C-5C44-B8C9-9A98D08A952F}" type="datetimeFigureOut">
               <a:rPr lang="en-US" smtClean="0"/>
-              <a:t>11/11/20</a:t>
+              <a:t>11/21/20</a:t>
             </a:fld>
             <a:endParaRPr lang="en-US"/>
           </a:p>
@@ -6951,7 +7303,7 @@
           <a:p>
             <a:fld id="{75A6CA30-8F9C-5C44-B8C9-9A98D08A952F}" type="datetimeFigureOut">
               <a:rPr lang="en-US" smtClean="0"/>
-              <a:t>11/11/20</a:t>
+              <a:t>11/21/20</a:t>
             </a:fld>
             <a:endParaRPr lang="en-US"/>
           </a:p>
@@ -7481,6 +7833,172 @@
 </p:sld>
 </file>
 
+<file path=ppt/slides/slide10.xml><?xml version="1.0" encoding="utf-8"?>
+<p:sld xmlns:a="http://schemas.openxmlformats.org/drawingml/2006/main" xmlns:r="http://schemas.openxmlformats.org/officeDocument/2006/relationships" xmlns:p="http://schemas.openxmlformats.org/presentationml/2006/main">
+  <p:cSld>
+    <p:spTree>
+      <p:nvGrpSpPr>
+        <p:cNvPr id="1" name=""/>
+        <p:cNvGrpSpPr/>
+        <p:nvPr/>
+      </p:nvGrpSpPr>
+      <p:grpSpPr>
+        <a:xfrm>
+          <a:off x="0" y="0"/>
+          <a:ext cx="0" cy="0"/>
+          <a:chOff x="0" y="0"/>
+          <a:chExt cx="0" cy="0"/>
+        </a:xfrm>
+      </p:grpSpPr>
+      <p:sp>
+        <p:nvSpPr>
+          <p:cNvPr id="7" name="Title 6">
+            <a:extLst>
+              <a:ext uri="{FF2B5EF4-FFF2-40B4-BE49-F238E27FC236}">
+                <a16:creationId xmlns:a16="http://schemas.microsoft.com/office/drawing/2014/main" id="{F37DBB5A-5153-0349-90E9-FC823E0EE8FB}"/>
+              </a:ext>
+            </a:extLst>
+          </p:cNvPr>
+          <p:cNvSpPr>
+            <a:spLocks noGrp="1"/>
+          </p:cNvSpPr>
+          <p:nvPr>
+            <p:ph type="title"/>
+          </p:nvPr>
+        </p:nvSpPr>
+        <p:spPr/>
+        <p:txBody>
+          <a:bodyPr/>
+          <a:lstStyle/>
+          <a:p>
+            <a:r>
+              <a:rPr lang="en-US" dirty="0"/>
+              <a:t>Plan</a:t>
+            </a:r>
+          </a:p>
+        </p:txBody>
+      </p:sp>
+      <p:sp>
+        <p:nvSpPr>
+          <p:cNvPr id="8" name="Content Placeholder 7">
+            <a:extLst>
+              <a:ext uri="{FF2B5EF4-FFF2-40B4-BE49-F238E27FC236}">
+                <a16:creationId xmlns:a16="http://schemas.microsoft.com/office/drawing/2014/main" id="{24239044-B002-FD4B-B9F2-34C1CDC15BF7}"/>
+              </a:ext>
+            </a:extLst>
+          </p:cNvPr>
+          <p:cNvSpPr>
+            <a:spLocks noGrp="1"/>
+          </p:cNvSpPr>
+          <p:nvPr>
+            <p:ph idx="1"/>
+          </p:nvPr>
+        </p:nvSpPr>
+        <p:spPr/>
+        <p:txBody>
+          <a:bodyPr>
+            <a:normAutofit/>
+          </a:bodyPr>
+          <a:lstStyle/>
+          <a:p>
+            <a:r>
+              <a:rPr lang="en-US" dirty="0"/>
+              <a:t>Explore basic Bayesian </a:t>
+            </a:r>
+            <a:r>
+              <a:rPr lang="en-GB" dirty="0"/>
+              <a:t>Optimisation</a:t>
+            </a:r>
+            <a:r>
+              <a:rPr lang="en-US" dirty="0"/>
+              <a:t> using Gaussian Process models</a:t>
+            </a:r>
+          </a:p>
+          <a:p>
+            <a:pPr lvl="1"/>
+            <a:r>
+              <a:rPr lang="en-US" dirty="0"/>
+              <a:t>Progressed</a:t>
+            </a:r>
+          </a:p>
+          <a:p>
+            <a:pPr lvl="1"/>
+            <a:r>
+              <a:rPr lang="en-US" dirty="0"/>
+              <a:t>Coded in Python using </a:t>
+            </a:r>
+            <a:r>
+              <a:rPr lang="en-US" dirty="0" err="1"/>
+              <a:t>GPyOpt</a:t>
+            </a:r>
+            <a:r>
+              <a:rPr lang="en-US" dirty="0"/>
+              <a:t> library basic functionality and low and high dimensional functions with known optimums</a:t>
+            </a:r>
+          </a:p>
+          <a:p>
+            <a:r>
+              <a:rPr lang="en-US" dirty="0"/>
+              <a:t>Find bottlenecks in the </a:t>
+            </a:r>
+            <a:r>
+              <a:rPr lang="en-GB" dirty="0"/>
+              <a:t>optimisation</a:t>
+            </a:r>
+            <a:r>
+              <a:rPr lang="en-US" dirty="0"/>
+              <a:t> process and explore how these can be reduced</a:t>
+            </a:r>
+          </a:p>
+          <a:p>
+            <a:pPr lvl="1"/>
+            <a:r>
+              <a:rPr lang="en-US" dirty="0"/>
+              <a:t>Sparse GP progressed, multi-fidelity GP progressing</a:t>
+            </a:r>
+          </a:p>
+          <a:p>
+            <a:r>
+              <a:rPr lang="en-US" dirty="0"/>
+              <a:t>Apply GP model </a:t>
+            </a:r>
+            <a:r>
+              <a:rPr lang="en-US" dirty="0" err="1"/>
+              <a:t>optimisation</a:t>
+            </a:r>
+            <a:r>
+              <a:rPr lang="en-US" dirty="0"/>
+              <a:t> on simple structural problems – connect GP and FEM of beams and cantilevers</a:t>
+            </a:r>
+          </a:p>
+          <a:p>
+            <a:pPr lvl="1"/>
+            <a:r>
+              <a:rPr lang="en-US" dirty="0"/>
+              <a:t>Progressing</a:t>
+            </a:r>
+          </a:p>
+          <a:p>
+            <a:r>
+              <a:rPr lang="en-US" dirty="0"/>
+              <a:t>Next term: Application on more complex structural problems</a:t>
+            </a:r>
+          </a:p>
+        </p:txBody>
+      </p:sp>
+    </p:spTree>
+    <p:extLst>
+      <p:ext uri="{BB962C8B-B14F-4D97-AF65-F5344CB8AC3E}">
+        <p14:creationId xmlns:p14="http://schemas.microsoft.com/office/powerpoint/2010/main" val="1448329055"/>
+      </p:ext>
+    </p:extLst>
+  </p:cSld>
+  <p:clrMapOvr>
+    <a:masterClrMapping/>
+  </p:clrMapOvr>
+</p:sld>
+</file>
+
 <file path=ppt/slides/slide2.xml><?xml version="1.0" encoding="utf-8"?>
 <p:sld xmlns:a="http://schemas.openxmlformats.org/drawingml/2006/main" xmlns:r="http://schemas.openxmlformats.org/officeDocument/2006/relationships" xmlns:p="http://schemas.openxmlformats.org/presentationml/2006/main">
   <p:cSld>
@@ -7599,6 +8117,12 @@
             <a:r>
               <a:rPr lang="en-GB" sz="2400" dirty="0"/>
               <a:t>Take noisy data points, estimate overall distribution and find the minimum point</a:t>
+            </a:r>
+          </a:p>
+          <a:p>
+            <a:r>
+              <a:rPr lang="en-GB" sz="2400" b="1" dirty="0"/>
+              <a:t>Save material and cost in building final product</a:t>
             </a:r>
           </a:p>
           <a:p>
@@ -7739,13 +8263,83 @@
           <a:chExt cx="0" cy="0"/>
         </a:xfrm>
       </p:grpSpPr>
+      <p:sp>
+        <p:nvSpPr>
+          <p:cNvPr id="71" name="Rounded Rectangle 11">
+            <a:extLst>
+              <a:ext uri="{FF2B5EF4-FFF2-40B4-BE49-F238E27FC236}">
+                <a16:creationId xmlns:a16="http://schemas.microsoft.com/office/drawing/2014/main" id="{2770B5F4-AED0-4A3A-859D-B6239ED38A3B}"/>
+              </a:ext>
+              <a:ext uri="{C183D7F6-B498-43B3-948B-1728B52AA6E4}">
+                <adec:decorative xmlns:adec="http://schemas.microsoft.com/office/drawing/2017/decorative" val="1"/>
+              </a:ext>
+            </a:extLst>
+          </p:cNvPr>
+          <p:cNvSpPr>
+            <a:spLocks noGrp="1" noRot="1" noChangeAspect="1" noMove="1" noResize="1" noEditPoints="1" noAdjustHandles="1" noChangeArrowheads="1" noChangeShapeType="1" noTextEdit="1"/>
+          </p:cNvSpPr>
+          <p:nvPr>
+            <p:extLst>
+              <p:ext uri="{386F3935-93C4-4BCD-93E2-E3B085C9AB24}">
+                <p16:designElem xmlns:p16="http://schemas.microsoft.com/office/powerpoint/2015/main" val="1"/>
+              </p:ext>
+            </p:extLst>
+          </p:nvPr>
+        </p:nvSpPr>
+        <p:spPr>
+          <a:xfrm>
+            <a:off x="643403" y="643464"/>
+            <a:ext cx="10905195" cy="5571072"/>
+          </a:xfrm>
+          <a:prstGeom prst="roundRect">
+            <a:avLst>
+              <a:gd name="adj" fmla="val 2403"/>
+            </a:avLst>
+          </a:prstGeom>
+          <a:solidFill>
+            <a:srgbClr val="FFFFFF"/>
+          </a:solidFill>
+          <a:ln>
+            <a:noFill/>
+          </a:ln>
+          <a:effectLst>
+            <a:innerShdw blurRad="114300">
+              <a:prstClr val="black"/>
+            </a:innerShdw>
+          </a:effectLst>
+        </p:spPr>
+        <p:style>
+          <a:lnRef idx="2">
+            <a:schemeClr val="accent1">
+              <a:shade val="50000"/>
+            </a:schemeClr>
+          </a:lnRef>
+          <a:fillRef idx="1">
+            <a:schemeClr val="accent1"/>
+          </a:fillRef>
+          <a:effectRef idx="0">
+            <a:schemeClr val="accent1"/>
+          </a:effectRef>
+          <a:fontRef idx="minor">
+            <a:schemeClr val="lt1"/>
+          </a:fontRef>
+        </p:style>
+        <p:txBody>
+          <a:bodyPr rtlCol="0" anchor="ctr"/>
+          <a:lstStyle/>
+          <a:p>
+            <a:pPr algn="ctr"/>
+            <a:endParaRPr lang="en-US"/>
+          </a:p>
+        </p:txBody>
+      </p:sp>
       <p:pic>
         <p:nvPicPr>
-          <p:cNvPr id="2050" name="Picture 2">
+          <p:cNvPr id="1026" name="Picture 2" descr="Jet Engine Mesh">
             <a:hlinkClick r:id="rId3"/>
             <a:extLst>
               <a:ext uri="{FF2B5EF4-FFF2-40B4-BE49-F238E27FC236}">
-                <a16:creationId xmlns:a16="http://schemas.microsoft.com/office/drawing/2014/main" id="{1FC59A39-B1D3-1848-AC75-7446E8988656}"/>
+                <a16:creationId xmlns:a16="http://schemas.microsoft.com/office/drawing/2014/main" id="{35A746A5-A355-874C-B27C-E7287F01607A}"/>
               </a:ext>
             </a:extLst>
           </p:cNvPr>
@@ -7768,8 +8362,8 @@
         </p:blipFill>
         <p:spPr bwMode="auto">
           <a:xfrm>
-            <a:off x="1406554" y="873252"/>
-            <a:ext cx="9378891" cy="5111496"/>
+            <a:off x="1427967" y="873252"/>
+            <a:ext cx="9336065" cy="5111496"/>
           </a:xfrm>
           <a:prstGeom prst="rect">
             <a:avLst/>
@@ -7928,7 +8522,7 @@
           <a:p>
             <a:r>
               <a:rPr lang="en-US" sz="2400" dirty="0"/>
-              <a:t>Can incorporate acquisition functions to efficiently find new data points of interest</a:t>
+              <a:t>Incorporate acquisition functions to efficiently find new data points of interest</a:t>
             </a:r>
           </a:p>
           <a:p>
@@ -7991,6 +8585,14 @@
 <file path=ppt/slides/slide6.xml><?xml version="1.0" encoding="utf-8"?>
 <p:sld xmlns:a="http://schemas.openxmlformats.org/drawingml/2006/main" xmlns:r="http://schemas.openxmlformats.org/officeDocument/2006/relationships" xmlns:p="http://schemas.openxmlformats.org/presentationml/2006/main">
   <p:cSld>
+    <p:bg>
+      <p:bgPr>
+        <a:solidFill>
+          <a:schemeClr val="bg1"/>
+        </a:solidFill>
+        <a:effectLst/>
+      </p:bgPr>
+    </p:bg>
     <p:spTree>
       <p:nvGrpSpPr>
         <p:cNvPr id="1" name=""/>
@@ -8007,6 +8609,142 @@
       </p:grpSpPr>
       <p:sp>
         <p:nvSpPr>
+          <p:cNvPr id="10" name="Rounded Rectangle 11">
+            <a:extLst>
+              <a:ext uri="{FF2B5EF4-FFF2-40B4-BE49-F238E27FC236}">
+                <a16:creationId xmlns:a16="http://schemas.microsoft.com/office/drawing/2014/main" id="{2770B5F4-AED0-4A3A-859D-B6239ED38A3B}"/>
+              </a:ext>
+              <a:ext uri="{C183D7F6-B498-43B3-948B-1728B52AA6E4}">
+                <adec:decorative xmlns:adec="http://schemas.microsoft.com/office/drawing/2017/decorative" val="1"/>
+              </a:ext>
+            </a:extLst>
+          </p:cNvPr>
+          <p:cNvSpPr>
+            <a:spLocks noGrp="1" noRot="1" noChangeAspect="1" noMove="1" noResize="1" noEditPoints="1" noAdjustHandles="1" noChangeArrowheads="1" noChangeShapeType="1" noTextEdit="1"/>
+          </p:cNvSpPr>
+          <p:nvPr>
+            <p:extLst>
+              <p:ext uri="{386F3935-93C4-4BCD-93E2-E3B085C9AB24}">
+                <p16:designElem xmlns:p16="http://schemas.microsoft.com/office/powerpoint/2015/main" val="1"/>
+              </p:ext>
+            </p:extLst>
+          </p:nvPr>
+        </p:nvSpPr>
+        <p:spPr>
+          <a:xfrm>
+            <a:off x="643403" y="643464"/>
+            <a:ext cx="10905195" cy="5571072"/>
+          </a:xfrm>
+          <a:prstGeom prst="roundRect">
+            <a:avLst>
+              <a:gd name="adj" fmla="val 2403"/>
+            </a:avLst>
+          </a:prstGeom>
+          <a:solidFill>
+            <a:srgbClr val="FFFFFF"/>
+          </a:solidFill>
+          <a:ln>
+            <a:noFill/>
+          </a:ln>
+          <a:effectLst>
+            <a:innerShdw blurRad="114300">
+              <a:prstClr val="black"/>
+            </a:innerShdw>
+          </a:effectLst>
+        </p:spPr>
+        <p:style>
+          <a:lnRef idx="2">
+            <a:schemeClr val="accent1">
+              <a:shade val="50000"/>
+            </a:schemeClr>
+          </a:lnRef>
+          <a:fillRef idx="1">
+            <a:schemeClr val="accent1"/>
+          </a:fillRef>
+          <a:effectRef idx="0">
+            <a:schemeClr val="accent1"/>
+          </a:effectRef>
+          <a:fontRef idx="minor">
+            <a:schemeClr val="lt1"/>
+          </a:fontRef>
+        </p:style>
+        <p:txBody>
+          <a:bodyPr rtlCol="0" anchor="ctr"/>
+          <a:lstStyle/>
+          <a:p>
+            <a:pPr algn="ctr"/>
+            <a:endParaRPr lang="en-US"/>
+          </a:p>
+        </p:txBody>
+      </p:sp>
+      <p:pic>
+        <p:nvPicPr>
+          <p:cNvPr id="5" name="Content Placeholder 4" descr="Chart, line chart&#10;&#10;Description automatically generated">
+            <a:extLst>
+              <a:ext uri="{FF2B5EF4-FFF2-40B4-BE49-F238E27FC236}">
+                <a16:creationId xmlns:a16="http://schemas.microsoft.com/office/drawing/2014/main" id="{CA3D4DB4-871A-0644-95F6-730E7E1EB8E2}"/>
+              </a:ext>
+            </a:extLst>
+          </p:cNvPr>
+          <p:cNvPicPr>
+            <a:picLocks noGrp="1" noChangeAspect="1"/>
+          </p:cNvPicPr>
+          <p:nvPr>
+            <p:ph idx="4294967295"/>
+          </p:nvPr>
+        </p:nvPicPr>
+        <p:blipFill>
+          <a:blip r:embed="rId3"/>
+          <a:stretch>
+            <a:fillRect/>
+          </a:stretch>
+        </p:blipFill>
+        <p:spPr>
+          <a:xfrm>
+            <a:off x="2533982" y="873252"/>
+            <a:ext cx="7124035" cy="5111496"/>
+          </a:xfrm>
+          <a:prstGeom prst="rect">
+            <a:avLst/>
+          </a:prstGeom>
+          <a:ln w="31750" cap="sq">
+            <a:noFill/>
+            <a:miter lim="800000"/>
+          </a:ln>
+        </p:spPr>
+      </p:pic>
+    </p:spTree>
+    <p:extLst>
+      <p:ext uri="{BB962C8B-B14F-4D97-AF65-F5344CB8AC3E}">
+        <p14:creationId xmlns:p14="http://schemas.microsoft.com/office/powerpoint/2010/main" val="3650423269"/>
+      </p:ext>
+    </p:extLst>
+  </p:cSld>
+  <p:clrMapOvr>
+    <a:masterClrMapping/>
+  </p:clrMapOvr>
+</p:sld>
+</file>
+
+<file path=ppt/slides/slide7.xml><?xml version="1.0" encoding="utf-8"?>
+<p:sld xmlns:a="http://schemas.openxmlformats.org/drawingml/2006/main" xmlns:r="http://schemas.openxmlformats.org/officeDocument/2006/relationships" xmlns:p="http://schemas.openxmlformats.org/presentationml/2006/main">
+  <p:cSld>
+    <p:spTree>
+      <p:nvGrpSpPr>
+        <p:cNvPr id="1" name=""/>
+        <p:cNvGrpSpPr/>
+        <p:nvPr/>
+      </p:nvGrpSpPr>
+      <p:grpSpPr>
+        <a:xfrm>
+          <a:off x="0" y="0"/>
+          <a:ext cx="0" cy="0"/>
+          <a:chOff x="0" y="0"/>
+          <a:chExt cx="0" cy="0"/>
+        </a:xfrm>
+      </p:grpSpPr>
+      <p:sp>
+        <p:nvSpPr>
           <p:cNvPr id="6" name="Text Placeholder 5">
             <a:extLst>
               <a:ext uri="{FF2B5EF4-FFF2-40B4-BE49-F238E27FC236}">
@@ -8088,6 +8826,7 @@
             </a:r>
           </a:p>
           <a:p>
+            <a:pPr lvl="1"/>
             <a:r>
               <a:rPr lang="en-US" dirty="0"/>
               <a:t>O(N</a:t>
@@ -8098,18 +8837,34 @@
             </a:r>
             <a:r>
               <a:rPr lang="en-US" dirty="0"/>
-              <a:t>) to calculate inverse of a matrix</a:t>
-            </a:r>
-          </a:p>
-          <a:p>
+              <a:t>) calculation</a:t>
+            </a:r>
+          </a:p>
+          <a:p>
+            <a:pPr lvl="1"/>
             <a:r>
               <a:rPr lang="en-US" dirty="0" err="1"/>
-              <a:t>Optimising</a:t>
+              <a:t>Optimisation</a:t>
             </a:r>
             <a:r>
               <a:rPr lang="en-US" dirty="0"/>
-              <a:t> with respect to many parameters and dealing with large datasets</a:t>
-            </a:r>
+              <a:t> takes long time if lots of high dim data points</a:t>
+            </a:r>
+          </a:p>
+          <a:p>
+            <a:r>
+              <a:rPr lang="en-US" dirty="0"/>
+              <a:t>FEM models can take very long to run, difficult to get lots/enough data points to fit GP</a:t>
+            </a:r>
+          </a:p>
+          <a:p>
+            <a:pPr marL="0" indent="0">
+              <a:buNone/>
+            </a:pPr>
+            <a:endParaRPr lang="en-US" dirty="0"/>
+          </a:p>
+          <a:p>
+            <a:endParaRPr lang="en-US" dirty="0" err="1"/>
           </a:p>
         </p:txBody>
       </p:sp>
@@ -8159,7 +8914,12 @@
             <p:ph sz="quarter" idx="4"/>
           </p:nvPr>
         </p:nvSpPr>
-        <p:spPr/>
+        <p:spPr>
+          <a:xfrm>
+            <a:off x="6364224" y="2743199"/>
+            <a:ext cx="4754880" cy="3640975"/>
+          </a:xfrm>
+        </p:spPr>
         <p:txBody>
           <a:bodyPr>
             <a:noAutofit/>
@@ -8186,21 +8946,6 @@
             <a:pPr lvl="1"/>
             <a:r>
               <a:rPr lang="en-US" sz="2000" dirty="0"/>
-              <a:t>Can </a:t>
-            </a:r>
-            <a:r>
-              <a:rPr lang="en-US" sz="2000" dirty="0" err="1"/>
-              <a:t>optimise</a:t>
-            </a:r>
-            <a:r>
-              <a:rPr lang="en-US" sz="2000" dirty="0"/>
-              <a:t> for where these pseudo-data are to get best approximate posterior distribution</a:t>
-            </a:r>
-          </a:p>
-          <a:p>
-            <a:pPr lvl="1"/>
-            <a:r>
-              <a:rPr lang="en-US" sz="2000" dirty="0"/>
               <a:t>Reduce complexity to O(N</a:t>
             </a:r>
             <a:r>
@@ -8217,10 +8962,44 @@
               <a:rPr lang="en-US" dirty="0"/>
               <a:t>Multi-fidelity GP</a:t>
             </a:r>
-            <a:endParaRPr lang="en-US" sz="2000" dirty="0"/>
-          </a:p>
-          <a:p>
-            <a:endParaRPr lang="en-US" dirty="0"/>
+          </a:p>
+          <a:p>
+            <a:pPr lvl="1"/>
+            <a:r>
+              <a:rPr lang="en-US" dirty="0"/>
+              <a:t>Take many samples from cheap to evaluate f</a:t>
+            </a:r>
+            <a:r>
+              <a:rPr lang="en-US" baseline="-25000" dirty="0"/>
+              <a:t>1</a:t>
+            </a:r>
+            <a:r>
+              <a:rPr lang="en-US" dirty="0"/>
+              <a:t>(x) and few samples from expensive f</a:t>
+            </a:r>
+            <a:r>
+              <a:rPr lang="en-US" baseline="-25000" dirty="0"/>
+              <a:t>2</a:t>
+            </a:r>
+            <a:r>
+              <a:rPr lang="en-US" dirty="0"/>
+              <a:t>(x)</a:t>
+            </a:r>
+          </a:p>
+          <a:p>
+            <a:pPr lvl="1"/>
+            <a:r>
+              <a:rPr lang="en-US" dirty="0"/>
+              <a:t>Combined training and prediction to get better estimation of high-fidelity f</a:t>
+            </a:r>
+            <a:r>
+              <a:rPr lang="en-US" baseline="-25000" dirty="0"/>
+              <a:t>2</a:t>
+            </a:r>
+            <a:r>
+              <a:rPr lang="en-US" dirty="0"/>
+              <a:t>(x)</a:t>
+            </a:r>
           </a:p>
         </p:txBody>
       </p:sp>
@@ -8247,7 +9026,7 @@
           <a:p>
             <a:r>
               <a:rPr lang="en-GB" dirty="0"/>
-              <a:t>Optimising</a:t>
+              <a:t>improving</a:t>
             </a:r>
             <a:r>
               <a:rPr lang="en-US" dirty="0"/>
@@ -8273,7 +9052,7 @@
 </p:sld>
 </file>
 
-<file path=ppt/slides/slide7.xml><?xml version="1.0" encoding="utf-8"?>
+<file path=ppt/slides/slide8.xml><?xml version="1.0" encoding="utf-8"?>
 <p:sld xmlns:a="http://schemas.openxmlformats.org/drawingml/2006/main" xmlns:r="http://schemas.openxmlformats.org/officeDocument/2006/relationships" xmlns:p="http://schemas.openxmlformats.org/presentationml/2006/main">
   <p:cSld>
     <p:bg>
@@ -8432,9 +9211,17 @@
 </p:sld>
 </file>
 
-<file path=ppt/slides/slide8.xml><?xml version="1.0" encoding="utf-8"?>
+<file path=ppt/slides/slide9.xml><?xml version="1.0" encoding="utf-8"?>
 <p:sld xmlns:a="http://schemas.openxmlformats.org/drawingml/2006/main" xmlns:r="http://schemas.openxmlformats.org/officeDocument/2006/relationships" xmlns:p="http://schemas.openxmlformats.org/presentationml/2006/main">
   <p:cSld>
+    <p:bg>
+      <p:bgPr>
+        <a:solidFill>
+          <a:schemeClr val="bg1"/>
+        </a:solidFill>
+        <a:effectLst/>
+      </p:bgPr>
+    </p:bg>
     <p:spTree>
       <p:nvGrpSpPr>
         <p:cNvPr id="1" name=""/>
@@ -8451,167 +9238,112 @@
       </p:grpSpPr>
       <p:sp>
         <p:nvSpPr>
-          <p:cNvPr id="7" name="Title 6">
+          <p:cNvPr id="7" name="Rounded Rectangle 11">
             <a:extLst>
               <a:ext uri="{FF2B5EF4-FFF2-40B4-BE49-F238E27FC236}">
-                <a16:creationId xmlns:a16="http://schemas.microsoft.com/office/drawing/2014/main" id="{F37DBB5A-5153-0349-90E9-FC823E0EE8FB}"/>
+                <a16:creationId xmlns:a16="http://schemas.microsoft.com/office/drawing/2014/main" id="{2770B5F4-AED0-4A3A-859D-B6239ED38A3B}"/>
+              </a:ext>
+              <a:ext uri="{C183D7F6-B498-43B3-948B-1728B52AA6E4}">
+                <adec:decorative xmlns:adec="http://schemas.microsoft.com/office/drawing/2017/decorative" val="1"/>
               </a:ext>
             </a:extLst>
           </p:cNvPr>
           <p:cNvSpPr>
-            <a:spLocks noGrp="1"/>
-          </p:cNvSpPr>
-          <p:nvPr>
-            <p:ph type="title"/>
-          </p:nvPr>
-        </p:nvSpPr>
-        <p:spPr/>
-        <p:txBody>
-          <a:bodyPr/>
-          <a:lstStyle/>
-          <a:p>
-            <a:r>
-              <a:rPr lang="en-US" dirty="0"/>
-              <a:t>Plan</a:t>
-            </a:r>
-          </a:p>
-        </p:txBody>
-      </p:sp>
-      <p:sp>
-        <p:nvSpPr>
-          <p:cNvPr id="8" name="Content Placeholder 7">
+            <a:spLocks noGrp="1" noRot="1" noChangeAspect="1" noMove="1" noResize="1" noEditPoints="1" noAdjustHandles="1" noChangeArrowheads="1" noChangeShapeType="1" noTextEdit="1"/>
+          </p:cNvSpPr>
+          <p:nvPr>
+            <p:extLst>
+              <p:ext uri="{386F3935-93C4-4BCD-93E2-E3B085C9AB24}">
+                <p16:designElem xmlns:p16="http://schemas.microsoft.com/office/powerpoint/2015/main" val="1"/>
+              </p:ext>
+            </p:extLst>
+          </p:nvPr>
+        </p:nvSpPr>
+        <p:spPr>
+          <a:xfrm>
+            <a:off x="643403" y="643464"/>
+            <a:ext cx="10905195" cy="5571072"/>
+          </a:xfrm>
+          <a:prstGeom prst="roundRect">
+            <a:avLst>
+              <a:gd name="adj" fmla="val 2403"/>
+            </a:avLst>
+          </a:prstGeom>
+          <a:solidFill>
+            <a:srgbClr val="FFFFFF"/>
+          </a:solidFill>
+          <a:ln>
+            <a:noFill/>
+          </a:ln>
+          <a:effectLst>
+            <a:innerShdw blurRad="114300">
+              <a:prstClr val="black"/>
+            </a:innerShdw>
+          </a:effectLst>
+        </p:spPr>
+        <p:style>
+          <a:lnRef idx="2">
+            <a:schemeClr val="accent1">
+              <a:shade val="50000"/>
+            </a:schemeClr>
+          </a:lnRef>
+          <a:fillRef idx="1">
+            <a:schemeClr val="accent1"/>
+          </a:fillRef>
+          <a:effectRef idx="0">
+            <a:schemeClr val="accent1"/>
+          </a:effectRef>
+          <a:fontRef idx="minor">
+            <a:schemeClr val="lt1"/>
+          </a:fontRef>
+        </p:style>
+        <p:txBody>
+          <a:bodyPr rtlCol="0" anchor="ctr"/>
+          <a:lstStyle/>
+          <a:p>
+            <a:pPr algn="ctr"/>
+            <a:endParaRPr lang="en-US"/>
+          </a:p>
+        </p:txBody>
+      </p:sp>
+      <p:pic>
+        <p:nvPicPr>
+          <p:cNvPr id="2" name="Picture 1" descr="Chart, line chart&#10;&#10;Description automatically generated">
+            <a:hlinkClick r:id="rId3"/>
             <a:extLst>
               <a:ext uri="{FF2B5EF4-FFF2-40B4-BE49-F238E27FC236}">
-                <a16:creationId xmlns:a16="http://schemas.microsoft.com/office/drawing/2014/main" id="{24239044-B002-FD4B-B9F2-34C1CDC15BF7}"/>
+                <a16:creationId xmlns:a16="http://schemas.microsoft.com/office/drawing/2014/main" id="{4501EB8F-B88A-BF4B-BEF9-A1AE2E490EEF}"/>
               </a:ext>
             </a:extLst>
           </p:cNvPr>
-          <p:cNvSpPr>
-            <a:spLocks noGrp="1"/>
-          </p:cNvSpPr>
-          <p:nvPr>
-            <p:ph idx="1"/>
-          </p:nvPr>
-        </p:nvSpPr>
-        <p:spPr/>
-        <p:txBody>
-          <a:bodyPr>
-            <a:normAutofit/>
-          </a:bodyPr>
-          <a:lstStyle/>
-          <a:p>
-            <a:r>
-              <a:rPr lang="en-US" dirty="0"/>
-              <a:t>Explore basic Bayesian </a:t>
-            </a:r>
-            <a:r>
-              <a:rPr lang="en-GB" dirty="0"/>
-              <a:t>Optimisation</a:t>
-            </a:r>
-            <a:r>
-              <a:rPr lang="en-US" dirty="0"/>
-              <a:t> using Gaussian Process models</a:t>
-            </a:r>
-          </a:p>
-          <a:p>
-            <a:pPr lvl="1"/>
-            <a:r>
-              <a:rPr lang="en-US" dirty="0"/>
-              <a:t>Progressed</a:t>
-            </a:r>
-          </a:p>
-          <a:p>
-            <a:pPr lvl="1"/>
-            <a:r>
-              <a:rPr lang="en-US" dirty="0"/>
-              <a:t>Coded in Python using </a:t>
-            </a:r>
-            <a:r>
-              <a:rPr lang="en-US" dirty="0" err="1"/>
-              <a:t>GPyOpt</a:t>
-            </a:r>
-            <a:r>
-              <a:rPr lang="en-US" dirty="0"/>
-              <a:t> library basic functionality and low and high dimensional functions with known optimums</a:t>
-            </a:r>
-          </a:p>
-          <a:p>
-            <a:r>
-              <a:rPr lang="en-US" dirty="0"/>
-              <a:t>Find bottlenecks in the </a:t>
-            </a:r>
-            <a:r>
-              <a:rPr lang="en-GB" dirty="0"/>
-              <a:t>optimisation</a:t>
-            </a:r>
-            <a:r>
-              <a:rPr lang="en-US" dirty="0"/>
-              <a:t> process and explore how these can be reduced</a:t>
-            </a:r>
-          </a:p>
-          <a:p>
-            <a:pPr lvl="1"/>
-            <a:r>
-              <a:rPr lang="en-US" dirty="0"/>
-              <a:t>Progressing – using Python </a:t>
-            </a:r>
-            <a:r>
-              <a:rPr lang="en-US" dirty="0" err="1"/>
-              <a:t>GPy</a:t>
-            </a:r>
-            <a:r>
-              <a:rPr lang="en-US" dirty="0"/>
-              <a:t> library for </a:t>
-            </a:r>
-            <a:r>
-              <a:rPr lang="en-US" dirty="0" err="1"/>
-              <a:t>sparseGP</a:t>
-            </a:r>
-            <a:r>
-              <a:rPr lang="en-US" dirty="0"/>
-              <a:t> support</a:t>
-            </a:r>
-          </a:p>
-          <a:p>
-            <a:r>
-              <a:rPr lang="en-US" dirty="0"/>
-              <a:t>Explore FEM code – build some basic models (cantilever beam, bridge, etc.)</a:t>
-            </a:r>
-          </a:p>
-          <a:p>
-            <a:r>
-              <a:rPr lang="en-US" dirty="0"/>
-              <a:t>Apply GP model </a:t>
-            </a:r>
-            <a:r>
-              <a:rPr lang="en-US" dirty="0" err="1"/>
-              <a:t>optimisation</a:t>
-            </a:r>
-            <a:r>
-              <a:rPr lang="en-US" dirty="0"/>
-              <a:t> on structural problems</a:t>
-            </a:r>
-          </a:p>
-          <a:p>
-            <a:r>
-              <a:rPr lang="en-US" dirty="0"/>
-              <a:t>Stretch goals – investigate other forms of statistical inference that can be applied to structural </a:t>
-            </a:r>
-            <a:r>
-              <a:rPr lang="en-US" dirty="0" err="1"/>
-              <a:t>optimisation</a:t>
-            </a:r>
-            <a:endParaRPr lang="en-US" dirty="0"/>
-          </a:p>
-          <a:p>
-            <a:endParaRPr lang="en-US" dirty="0"/>
-          </a:p>
-        </p:txBody>
-      </p:sp>
+          <p:cNvPicPr>
+            <a:picLocks noChangeAspect="1"/>
+          </p:cNvPicPr>
+          <p:nvPr/>
+        </p:nvPicPr>
+        <p:blipFill rotWithShape="1">
+          <a:blip r:embed="rId4"/>
+          <a:srcRect t="5273"/>
+          <a:stretch/>
+        </p:blipFill>
+        <p:spPr>
+          <a:xfrm>
+            <a:off x="1363131" y="873252"/>
+            <a:ext cx="9465738" cy="5111496"/>
+          </a:xfrm>
+          <a:prstGeom prst="rect">
+            <a:avLst/>
+          </a:prstGeom>
+          <a:ln w="31750" cap="sq">
+            <a:noFill/>
+            <a:miter lim="800000"/>
+          </a:ln>
+        </p:spPr>
+      </p:pic>
     </p:spTree>
     <p:extLst>
       <p:ext uri="{BB962C8B-B14F-4D97-AF65-F5344CB8AC3E}">
-        <p14:creationId xmlns:p14="http://schemas.microsoft.com/office/powerpoint/2010/main" val="1448329055"/>
+        <p14:creationId xmlns:p14="http://schemas.microsoft.com/office/powerpoint/2010/main" val="1153423290"/>
       </p:ext>
     </p:extLst>
   </p:cSld>

</xml_diff>

<commit_message>
testing with multi-fidelity GP, update logbook
</commit_message>
<xml_diff>
--- a/Michaelmas Presenation.pptx
+++ b/Michaelmas Presenation.pptx
@@ -206,7 +206,7 @@
           <a:p>
             <a:fld id="{D06EE488-76A6-BE46-8D6F-F46FA021F807}" type="datetimeFigureOut">
               <a:rPr lang="en-GB" smtClean="0"/>
-              <a:t>21/11/2020</a:t>
+              <a:t>24/11/2020</a:t>
             </a:fld>
             <a:endParaRPr lang="en-GB"/>
           </a:p>
@@ -576,6 +576,33 @@
               <a:t>the progress made so far towards fulfilling the plans.</a:t>
             </a:r>
           </a:p>
+          <a:p>
+            <a:pPr fontAlgn="base"/>
+            <a:endParaRPr lang="en-GB" sz="1200" b="0" i="0" kern="1200" dirty="0">
+              <a:solidFill>
+                <a:schemeClr val="tx1"/>
+              </a:solidFill>
+              <a:effectLst/>
+              <a:latin typeface="+mn-lt"/>
+              <a:ea typeface="+mn-ea"/>
+              <a:cs typeface="+mn-cs"/>
+            </a:endParaRPr>
+          </a:p>
+          <a:p>
+            <a:pPr fontAlgn="base"/>
+            <a:r>
+              <a:rPr lang="en-GB" sz="1200" b="0" i="0" kern="1200" dirty="0">
+                <a:solidFill>
+                  <a:schemeClr val="tx1"/>
+                </a:solidFill>
+                <a:effectLst/>
+                <a:latin typeface="+mn-lt"/>
+                <a:ea typeface="+mn-ea"/>
+                <a:cs typeface="+mn-cs"/>
+              </a:rPr>
+              <a:t>WHY? – add some motivation statement</a:t>
+            </a:r>
+          </a:p>
         </p:txBody>
       </p:sp>
       <p:sp>
@@ -785,6 +812,9 @@
           <a:p>
             <a:endParaRPr lang="en-GB" dirty="0"/>
           </a:p>
+          <a:p>
+            <a:endParaRPr lang="en-GB" dirty="0"/>
+          </a:p>
         </p:txBody>
       </p:sp>
       <p:sp>
@@ -906,6 +936,12 @@
           <a:p>
             <a:endParaRPr lang="en-GB" dirty="0"/>
           </a:p>
+          <a:p>
+            <a:r>
+              <a:rPr lang="en-GB" dirty="0"/>
+              <a:t>**Add text</a:t>
+            </a:r>
+          </a:p>
         </p:txBody>
       </p:sp>
       <p:sp>
@@ -1033,6 +1069,52 @@
               <a:t>Jet engine model – can use this technique to find optimal angle/shape of turbine fins, minimising material weight and keeping stresses within some limits</a:t>
             </a:r>
           </a:p>
+          <a:p>
+            <a:pPr marL="0" marR="0" lvl="0" indent="0" algn="l" defTabSz="914400" rtl="0" eaLnBrk="1" fontAlgn="auto" latinLnBrk="0" hangingPunct="1">
+              <a:lnSpc>
+                <a:spcPct val="100000"/>
+              </a:lnSpc>
+              <a:spcBef>
+                <a:spcPts val="0"/>
+              </a:spcBef>
+              <a:spcAft>
+                <a:spcPts val="0"/>
+              </a:spcAft>
+              <a:buClrTx/>
+              <a:buSzTx/>
+              <a:buFontTx/>
+              <a:buNone/>
+              <a:tabLst/>
+              <a:defRPr/>
+            </a:pPr>
+            <a:r>
+              <a:rPr lang="en-GB" dirty="0"/>
+              <a:t>Takes long time to compute – order of an hour</a:t>
+            </a:r>
+          </a:p>
+          <a:p>
+            <a:pPr marL="0" marR="0" lvl="0" indent="0" algn="l" defTabSz="914400" rtl="0" eaLnBrk="1" fontAlgn="auto" latinLnBrk="0" hangingPunct="1">
+              <a:lnSpc>
+                <a:spcPct val="100000"/>
+              </a:lnSpc>
+              <a:spcBef>
+                <a:spcPts val="0"/>
+              </a:spcBef>
+              <a:spcAft>
+                <a:spcPts val="0"/>
+              </a:spcAft>
+              <a:buClrTx/>
+              <a:buSzTx/>
+              <a:buFontTx/>
+              <a:buNone/>
+              <a:tabLst/>
+              <a:defRPr/>
+            </a:pPr>
+            <a:r>
+              <a:rPr lang="en-GB" dirty="0"/>
+              <a:t>Can’t do trial and error - can we take data driven approach</a:t>
+            </a:r>
+          </a:p>
         </p:txBody>
       </p:sp>
       <p:sp>
@@ -1143,6 +1225,15 @@
               <a:t>Bayesian optimisation part - Acquisition function balances exploration and exploitation</a:t>
             </a:r>
           </a:p>
+          <a:p>
+            <a:endParaRPr lang="en-GB" dirty="0"/>
+          </a:p>
+          <a:p>
+            <a:r>
+              <a:rPr lang="en-GB" dirty="0"/>
+              <a:t>Here only showing 1D – much more complicated in higher dimensions</a:t>
+            </a:r>
+          </a:p>
         </p:txBody>
       </p:sp>
       <p:sp>
@@ -1228,6 +1319,12 @@
             <a:r>
               <a:rPr lang="en-GB" dirty="0"/>
               <a:t>GP optimisation testing that I did</a:t>
+            </a:r>
+          </a:p>
+          <a:p>
+            <a:r>
+              <a:rPr lang="en-GB" dirty="0"/>
+              <a:t>**add animation</a:t>
             </a:r>
           </a:p>
         </p:txBody>
@@ -1817,7 +1914,7 @@
           <a:p>
             <a:fld id="{75A6CA30-8F9C-5C44-B8C9-9A98D08A952F}" type="datetimeFigureOut">
               <a:rPr lang="en-US" smtClean="0"/>
-              <a:t>11/21/20</a:t>
+              <a:t>11/24/20</a:t>
             </a:fld>
             <a:endParaRPr lang="en-US"/>
           </a:p>
@@ -2084,7 +2181,7 @@
           <a:p>
             <a:fld id="{75A6CA30-8F9C-5C44-B8C9-9A98D08A952F}" type="datetimeFigureOut">
               <a:rPr lang="en-US" smtClean="0"/>
-              <a:t>11/21/20</a:t>
+              <a:t>11/24/20</a:t>
             </a:fld>
             <a:endParaRPr lang="en-US"/>
           </a:p>
@@ -2315,7 +2412,7 @@
           <a:p>
             <a:fld id="{75A6CA30-8F9C-5C44-B8C9-9A98D08A952F}" type="datetimeFigureOut">
               <a:rPr lang="en-US" smtClean="0"/>
-              <a:t>11/21/20</a:t>
+              <a:t>11/24/20</a:t>
             </a:fld>
             <a:endParaRPr lang="en-US"/>
           </a:p>
@@ -2625,7 +2722,7 @@
           <a:p>
             <a:fld id="{75A6CA30-8F9C-5C44-B8C9-9A98D08A952F}" type="datetimeFigureOut">
               <a:rPr lang="en-US" smtClean="0"/>
-              <a:t>11/21/20</a:t>
+              <a:t>11/24/20</a:t>
             </a:fld>
             <a:endParaRPr lang="en-US"/>
           </a:p>
@@ -3098,7 +3195,7 @@
           <a:p>
             <a:fld id="{75A6CA30-8F9C-5C44-B8C9-9A98D08A952F}" type="datetimeFigureOut">
               <a:rPr lang="en-US" smtClean="0"/>
-              <a:t>11/21/20</a:t>
+              <a:t>11/24/20</a:t>
             </a:fld>
             <a:endParaRPr lang="en-US"/>
           </a:p>
@@ -3645,7 +3742,7 @@
           <a:p>
             <a:fld id="{75A6CA30-8F9C-5C44-B8C9-9A98D08A952F}" type="datetimeFigureOut">
               <a:rPr lang="en-US" smtClean="0"/>
-              <a:t>11/21/20</a:t>
+              <a:t>11/24/20</a:t>
             </a:fld>
             <a:endParaRPr lang="en-US"/>
           </a:p>
@@ -4419,7 +4516,7 @@
           <a:p>
             <a:fld id="{75A6CA30-8F9C-5C44-B8C9-9A98D08A952F}" type="datetimeFigureOut">
               <a:rPr lang="en-US" smtClean="0"/>
-              <a:t>11/21/20</a:t>
+              <a:t>11/24/20</a:t>
             </a:fld>
             <a:endParaRPr lang="en-US"/>
           </a:p>
@@ -4594,7 +4691,7 @@
           <a:p>
             <a:fld id="{75A6CA30-8F9C-5C44-B8C9-9A98D08A952F}" type="datetimeFigureOut">
               <a:rPr lang="en-US" smtClean="0"/>
-              <a:t>11/21/20</a:t>
+              <a:t>11/24/20</a:t>
             </a:fld>
             <a:endParaRPr lang="en-US"/>
           </a:p>
@@ -4817,7 +4914,7 @@
           <a:p>
             <a:fld id="{75A6CA30-8F9C-5C44-B8C9-9A98D08A952F}" type="datetimeFigureOut">
               <a:rPr lang="en-US" smtClean="0"/>
-              <a:t>11/21/20</a:t>
+              <a:t>11/24/20</a:t>
             </a:fld>
             <a:endParaRPr lang="en-US"/>
           </a:p>
@@ -5238,7 +5335,7 @@
           <a:p>
             <a:fld id="{75A6CA30-8F9C-5C44-B8C9-9A98D08A952F}" type="datetimeFigureOut">
               <a:rPr lang="en-US" smtClean="0"/>
-              <a:t>11/21/20</a:t>
+              <a:t>11/24/20</a:t>
             </a:fld>
             <a:endParaRPr lang="en-US"/>
           </a:p>
@@ -5431,7 +5528,7 @@
           <a:p>
             <a:fld id="{75A6CA30-8F9C-5C44-B8C9-9A98D08A952F}" type="datetimeFigureOut">
               <a:rPr lang="en-US" smtClean="0"/>
-              <a:t>11/21/20</a:t>
+              <a:t>11/24/20</a:t>
             </a:fld>
             <a:endParaRPr lang="en-US"/>
           </a:p>
@@ -5720,7 +5817,7 @@
           <a:p>
             <a:fld id="{75A6CA30-8F9C-5C44-B8C9-9A98D08A952F}" type="datetimeFigureOut">
               <a:rPr lang="en-US" smtClean="0"/>
-              <a:t>11/21/20</a:t>
+              <a:t>11/24/20</a:t>
             </a:fld>
             <a:endParaRPr lang="en-US"/>
           </a:p>
@@ -5962,7 +6059,7 @@
           <a:p>
             <a:fld id="{75A6CA30-8F9C-5C44-B8C9-9A98D08A952F}" type="datetimeFigureOut">
               <a:rPr lang="en-US" smtClean="0"/>
-              <a:t>11/21/20</a:t>
+              <a:t>11/24/20</a:t>
             </a:fld>
             <a:endParaRPr lang="en-US"/>
           </a:p>
@@ -6341,7 +6438,7 @@
           <a:p>
             <a:fld id="{75A6CA30-8F9C-5C44-B8C9-9A98D08A952F}" type="datetimeFigureOut">
               <a:rPr lang="en-US" smtClean="0"/>
-              <a:t>11/21/20</a:t>
+              <a:t>11/24/20</a:t>
             </a:fld>
             <a:endParaRPr lang="en-US"/>
           </a:p>
@@ -6459,7 +6556,7 @@
           <a:p>
             <a:fld id="{75A6CA30-8F9C-5C44-B8C9-9A98D08A952F}" type="datetimeFigureOut">
               <a:rPr lang="en-US" smtClean="0"/>
-              <a:t>11/21/20</a:t>
+              <a:t>11/24/20</a:t>
             </a:fld>
             <a:endParaRPr lang="en-US"/>
           </a:p>
@@ -6554,7 +6651,7 @@
           <a:p>
             <a:fld id="{75A6CA30-8F9C-5C44-B8C9-9A98D08A952F}" type="datetimeFigureOut">
               <a:rPr lang="en-US" smtClean="0"/>
-              <a:t>11/21/20</a:t>
+              <a:t>11/24/20</a:t>
             </a:fld>
             <a:endParaRPr lang="en-US"/>
           </a:p>
@@ -6803,7 +6900,7 @@
           <a:p>
             <a:fld id="{75A6CA30-8F9C-5C44-B8C9-9A98D08A952F}" type="datetimeFigureOut">
               <a:rPr lang="en-US" smtClean="0"/>
-              <a:t>11/21/20</a:t>
+              <a:t>11/24/20</a:t>
             </a:fld>
             <a:endParaRPr lang="en-US"/>
           </a:p>
@@ -7060,7 +7157,7 @@
           <a:p>
             <a:fld id="{75A6CA30-8F9C-5C44-B8C9-9A98D08A952F}" type="datetimeFigureOut">
               <a:rPr lang="en-US" smtClean="0"/>
-              <a:t>11/21/20</a:t>
+              <a:t>11/24/20</a:t>
             </a:fld>
             <a:endParaRPr lang="en-US"/>
           </a:p>
@@ -7303,7 +7400,7 @@
           <a:p>
             <a:fld id="{75A6CA30-8F9C-5C44-B8C9-9A98D08A952F}" type="datetimeFigureOut">
               <a:rPr lang="en-US" smtClean="0"/>
-              <a:t>11/21/20</a:t>
+              <a:t>11/24/20</a:t>
             </a:fld>
             <a:endParaRPr lang="en-US"/>
           </a:p>
@@ -8092,9 +8189,16 @@
         </p:spPr>
         <p:txBody>
           <a:bodyPr>
-            <a:normAutofit/>
+            <a:normAutofit lnSpcReduction="10000"/>
           </a:bodyPr>
           <a:lstStyle/>
+          <a:p>
+            <a:r>
+              <a:rPr lang="en-GB" sz="2400" b="1" dirty="0"/>
+              <a:t>Save material and cost in building final product</a:t>
+            </a:r>
+            <a:endParaRPr lang="en-GB" sz="2400" dirty="0"/>
+          </a:p>
           <a:p>
             <a:r>
               <a:rPr lang="en-GB" sz="2400" dirty="0"/>
@@ -8121,8 +8225,8 @@
           </a:p>
           <a:p>
             <a:r>
-              <a:rPr lang="en-GB" sz="2400" b="1" dirty="0"/>
-              <a:t>Save material and cost in building final product</a:t>
+              <a:rPr lang="en-GB" sz="2400" dirty="0"/>
+              <a:t>Is there a data driven approach?</a:t>
             </a:r>
           </a:p>
           <a:p>

</xml_diff>

<commit_message>
high dim multi-fidelity GP, update logbook
</commit_message>
<xml_diff>
--- a/Michaelmas Presenation.pptx
+++ b/Michaelmas Presenation.pptx
@@ -5,7 +5,7 @@
     <p:sldMasterId id="2147484093" r:id="rId1"/>
   </p:sldMasterIdLst>
   <p:notesMasterIdLst>
-    <p:notesMasterId r:id="rId12"/>
+    <p:notesMasterId r:id="rId13"/>
   </p:notesMasterIdLst>
   <p:sldIdLst>
     <p:sldId id="256" r:id="rId2"/>
@@ -14,10 +14,11 @@
     <p:sldId id="263" r:id="rId5"/>
     <p:sldId id="258" r:id="rId6"/>
     <p:sldId id="267" r:id="rId7"/>
-    <p:sldId id="261" r:id="rId8"/>
-    <p:sldId id="265" r:id="rId9"/>
-    <p:sldId id="266" r:id="rId10"/>
-    <p:sldId id="262" r:id="rId11"/>
+    <p:sldId id="268" r:id="rId8"/>
+    <p:sldId id="261" r:id="rId9"/>
+    <p:sldId id="265" r:id="rId10"/>
+    <p:sldId id="266" r:id="rId11"/>
+    <p:sldId id="262" r:id="rId12"/>
   </p:sldIdLst>
   <p:sldSz cx="12192000" cy="6858000"/>
   <p:notesSz cx="6858000" cy="9144000"/>
@@ -206,7 +207,7 @@
           <a:p>
             <a:fld id="{D06EE488-76A6-BE46-8D6F-F46FA021F807}" type="datetimeFigureOut">
               <a:rPr lang="en-GB" smtClean="0"/>
-              <a:t>24/11/2020</a:t>
+              <a:t>26/11/2020</a:t>
             </a:fld>
             <a:endParaRPr lang="en-GB"/>
           </a:p>
@@ -600,7 +601,7 @@
                 <a:ea typeface="+mn-ea"/>
                 <a:cs typeface="+mn-cs"/>
               </a:rPr>
-              <a:t>WHY? – add some motivation statement</a:t>
+              <a:t>WHY? – want to get best product for least cost (money and time)</a:t>
             </a:r>
           </a:p>
         </p:txBody>
@@ -687,6 +688,104 @@
           <a:p>
             <a:r>
               <a:rPr lang="en-GB" dirty="0"/>
+              <a:t>Multi-fidelity GP example</a:t>
+            </a:r>
+          </a:p>
+          <a:p>
+            <a:r>
+              <a:rPr lang="en-GB" dirty="0"/>
+              <a:t>- Still investigating this, but we seem to have to consider the ratio of data points between HF and LF, and could potentially be confidently wrong in </a:t>
+            </a:r>
+            <a:r>
+              <a:rPr lang="en-GB"/>
+              <a:t>the prediction</a:t>
+            </a:r>
+            <a:endParaRPr lang="en-GB" dirty="0"/>
+          </a:p>
+        </p:txBody>
+      </p:sp>
+      <p:sp>
+        <p:nvSpPr>
+          <p:cNvPr id="4" name="Slide Number Placeholder 3"/>
+          <p:cNvSpPr>
+            <a:spLocks noGrp="1"/>
+          </p:cNvSpPr>
+          <p:nvPr>
+            <p:ph type="sldNum" sz="quarter" idx="5"/>
+          </p:nvPr>
+        </p:nvSpPr>
+        <p:spPr/>
+        <p:txBody>
+          <a:bodyPr/>
+          <a:lstStyle/>
+          <a:p>
+            <a:fld id="{87D6E53E-8426-0E4E-975A-4A143A8DCEB2}" type="slidenum">
+              <a:rPr lang="en-GB" smtClean="0"/>
+              <a:t>10</a:t>
+            </a:fld>
+            <a:endParaRPr lang="en-GB"/>
+          </a:p>
+        </p:txBody>
+      </p:sp>
+    </p:spTree>
+    <p:extLst>
+      <p:ext uri="{BB962C8B-B14F-4D97-AF65-F5344CB8AC3E}">
+        <p14:creationId xmlns:p14="http://schemas.microsoft.com/office/powerpoint/2010/main" val="4257190783"/>
+      </p:ext>
+    </p:extLst>
+  </p:cSld>
+  <p:clrMapOvr>
+    <a:masterClrMapping/>
+  </p:clrMapOvr>
+</p:notes>
+</file>
+
+<file path=ppt/notesSlides/notesSlide11.xml><?xml version="1.0" encoding="utf-8"?>
+<p:notes xmlns:a="http://schemas.openxmlformats.org/drawingml/2006/main" xmlns:r="http://schemas.openxmlformats.org/officeDocument/2006/relationships" xmlns:p="http://schemas.openxmlformats.org/presentationml/2006/main">
+  <p:cSld>
+    <p:spTree>
+      <p:nvGrpSpPr>
+        <p:cNvPr id="1" name=""/>
+        <p:cNvGrpSpPr/>
+        <p:nvPr/>
+      </p:nvGrpSpPr>
+      <p:grpSpPr>
+        <a:xfrm>
+          <a:off x="0" y="0"/>
+          <a:ext cx="0" cy="0"/>
+          <a:chOff x="0" y="0"/>
+          <a:chExt cx="0" cy="0"/>
+        </a:xfrm>
+      </p:grpSpPr>
+      <p:sp>
+        <p:nvSpPr>
+          <p:cNvPr id="2" name="Slide Image Placeholder 1"/>
+          <p:cNvSpPr>
+            <a:spLocks noGrp="1" noRot="1" noChangeAspect="1"/>
+          </p:cNvSpPr>
+          <p:nvPr>
+            <p:ph type="sldImg"/>
+          </p:nvPr>
+        </p:nvSpPr>
+        <p:spPr/>
+      </p:sp>
+      <p:sp>
+        <p:nvSpPr>
+          <p:cNvPr id="3" name="Notes Placeholder 2"/>
+          <p:cNvSpPr>
+            <a:spLocks noGrp="1"/>
+          </p:cNvSpPr>
+          <p:nvPr>
+            <p:ph type="body" idx="1"/>
+          </p:nvPr>
+        </p:nvSpPr>
+        <p:spPr/>
+        <p:txBody>
+          <a:bodyPr/>
+          <a:lstStyle/>
+          <a:p>
+            <a:r>
+              <a:rPr lang="en-GB" dirty="0"/>
               <a:t>Aim: explore how Bayesian optimisation can be applied on structural optimisation problems using Gaussian Process models trained on FEM data.</a:t>
             </a:r>
           </a:p>
@@ -703,7 +802,7 @@
             </a:pPr>
             <a:r>
               <a:rPr lang="en-GB" dirty="0"/>
-              <a:t>Sparse GP good for when initially given lots of data points but not for using acquisition function to get more points – probably estimations stacking</a:t>
+              <a:t>Sparse GP good for when initially given lots of data points</a:t>
             </a:r>
           </a:p>
           <a:p>
@@ -711,7 +810,18 @@
               <a:buFontTx/>
               <a:buChar char="-"/>
             </a:pPr>
-            <a:endParaRPr lang="en-GB" dirty="0"/>
+            <a:r>
+              <a:rPr lang="en-GB" dirty="0"/>
+              <a:t>Obtaining data points is probably  most time consuming part – apply multi-fidelity </a:t>
+            </a:r>
+            <a:r>
+              <a:rPr lang="en-GB" dirty="0" err="1"/>
+              <a:t>gp</a:t>
+            </a:r>
+            <a:r>
+              <a:rPr lang="en-GB" dirty="0"/>
+              <a:t> instead</a:t>
+            </a:r>
           </a:p>
         </p:txBody>
       </p:sp>
@@ -732,7 +842,7 @@
           <a:p>
             <a:fld id="{87D6E53E-8426-0E4E-975A-4A143A8DCEB2}" type="slidenum">
               <a:rPr lang="en-GB" smtClean="0"/>
-              <a:t>10</a:t>
+              <a:t>11</a:t>
             </a:fld>
             <a:endParaRPr lang="en-GB"/>
           </a:p>
@@ -936,12 +1046,6 @@
           <a:p>
             <a:endParaRPr lang="en-GB" dirty="0"/>
           </a:p>
-          <a:p>
-            <a:r>
-              <a:rPr lang="en-GB" dirty="0"/>
-              <a:t>**Add text</a:t>
-            </a:r>
-          </a:p>
         </p:txBody>
       </p:sp>
       <p:sp>
@@ -1321,12 +1425,6 @@
               <a:t>GP optimisation testing that I did</a:t>
             </a:r>
           </a:p>
-          <a:p>
-            <a:r>
-              <a:rPr lang="en-GB" dirty="0"/>
-              <a:t>**add animation</a:t>
-            </a:r>
-          </a:p>
         </p:txBody>
       </p:sp>
       <p:sp>
@@ -1411,125 +1509,7 @@
           <a:p>
             <a:r>
               <a:rPr lang="en-GB" dirty="0"/>
-              <a:t>Posterior of the Gaussian process</a:t>
-            </a:r>
-          </a:p>
-          <a:p>
-            <a:r>
-              <a:rPr lang="en-GB" dirty="0"/>
-              <a:t>calculating each point takes very long time when FEM models complex and large</a:t>
-            </a:r>
-          </a:p>
-          <a:p>
-            <a:r>
-              <a:rPr lang="en-GB" dirty="0"/>
-              <a:t>Sparse GP:</a:t>
-            </a:r>
-          </a:p>
-          <a:p>
-            <a:pPr marL="0" marR="0" lvl="0" indent="0" algn="l" defTabSz="914400" rtl="0" eaLnBrk="1" fontAlgn="auto" latinLnBrk="0" hangingPunct="1">
-              <a:lnSpc>
-                <a:spcPct val="100000"/>
-              </a:lnSpc>
-              <a:spcBef>
-                <a:spcPts val="0"/>
-              </a:spcBef>
-              <a:spcAft>
-                <a:spcPts val="0"/>
-              </a:spcAft>
-              <a:buClrTx/>
-              <a:buSzTx/>
-              <a:buFontTx/>
-              <a:buNone/>
-              <a:tabLst/>
-              <a:defRPr/>
-            </a:pPr>
-            <a:r>
-              <a:rPr lang="en-US" sz="1200" dirty="0"/>
-              <a:t>Can </a:t>
-            </a:r>
-            <a:r>
-              <a:rPr lang="en-US" sz="1200" dirty="0" err="1"/>
-              <a:t>optimise</a:t>
-            </a:r>
-            <a:r>
-              <a:rPr lang="en-US" sz="1200" dirty="0"/>
-              <a:t> for where these pseudo-data are to get best approximate posterior distribution</a:t>
-            </a:r>
-          </a:p>
-          <a:p>
-            <a:pPr marL="0" marR="0" lvl="0" indent="0" algn="l" defTabSz="914400" rtl="0" eaLnBrk="1" fontAlgn="auto" latinLnBrk="0" hangingPunct="1">
-              <a:lnSpc>
-                <a:spcPct val="100000"/>
-              </a:lnSpc>
-              <a:spcBef>
-                <a:spcPts val="0"/>
-              </a:spcBef>
-              <a:spcAft>
-                <a:spcPts val="0"/>
-              </a:spcAft>
-              <a:buClrTx/>
-              <a:buSzTx/>
-              <a:buFontTx/>
-              <a:buNone/>
-              <a:tabLst/>
-              <a:defRPr/>
-            </a:pPr>
-            <a:endParaRPr lang="en-US" sz="1200" dirty="0"/>
-          </a:p>
-          <a:p>
-            <a:pPr marL="0" marR="0" lvl="0" indent="0" algn="l" defTabSz="914400" rtl="0" eaLnBrk="1" fontAlgn="auto" latinLnBrk="0" hangingPunct="1">
-              <a:lnSpc>
-                <a:spcPct val="100000"/>
-              </a:lnSpc>
-              <a:spcBef>
-                <a:spcPts val="0"/>
-              </a:spcBef>
-              <a:spcAft>
-                <a:spcPts val="0"/>
-              </a:spcAft>
-              <a:buClrTx/>
-              <a:buSzTx/>
-              <a:buFontTx/>
-              <a:buNone/>
-              <a:tabLst/>
-              <a:defRPr/>
-            </a:pPr>
-            <a:r>
-              <a:rPr lang="en-US" sz="1200" dirty="0"/>
-              <a:t>Multi-fidelity GP:</a:t>
-            </a:r>
-          </a:p>
-          <a:p>
-            <a:pPr marL="0" marR="0" lvl="0" indent="0" algn="l" defTabSz="914400" rtl="0" eaLnBrk="1" fontAlgn="auto" latinLnBrk="0" hangingPunct="1">
-              <a:lnSpc>
-                <a:spcPct val="100000"/>
-              </a:lnSpc>
-              <a:spcBef>
-                <a:spcPts val="0"/>
-              </a:spcBef>
-              <a:spcAft>
-                <a:spcPts val="0"/>
-              </a:spcAft>
-              <a:buClrTx/>
-              <a:buSzTx/>
-              <a:buFontTx/>
-              <a:buNone/>
-              <a:tabLst/>
-              <a:defRPr/>
-            </a:pPr>
-            <a:r>
-              <a:rPr lang="en-US" sz="1200" dirty="0"/>
-              <a:t>Low fidelity GP model, related high fidelity GP model, combine training – joint </a:t>
-            </a:r>
-          </a:p>
-          <a:p>
-            <a:endParaRPr lang="en-GB" dirty="0"/>
-          </a:p>
-          <a:p>
-            <a:r>
-              <a:rPr lang="en-GB" dirty="0"/>
-              <a:t>Different approaches to handle high-dimensional space, large calculations</a:t>
+              <a:t>Animation of acquisition function use</a:t>
             </a:r>
           </a:p>
         </p:txBody>
@@ -1560,7 +1540,7 @@
     </p:spTree>
     <p:extLst>
       <p:ext uri="{BB962C8B-B14F-4D97-AF65-F5344CB8AC3E}">
-        <p14:creationId xmlns:p14="http://schemas.microsoft.com/office/powerpoint/2010/main" val="4104965006"/>
+        <p14:creationId xmlns:p14="http://schemas.microsoft.com/office/powerpoint/2010/main" val="2591703809"/>
       </p:ext>
     </p:extLst>
   </p:cSld>
@@ -1616,7 +1596,148 @@
           <a:p>
             <a:r>
               <a:rPr lang="en-GB" dirty="0"/>
-              <a:t>Sparse GP</a:t>
+              <a:t>Posterior of the Gaussian process</a:t>
+            </a:r>
+          </a:p>
+          <a:p>
+            <a:r>
+              <a:rPr lang="en-GB" dirty="0"/>
+              <a:t>calculating each point takes very long time when FEM models complex and large</a:t>
+            </a:r>
+          </a:p>
+          <a:p>
+            <a:r>
+              <a:rPr lang="en-GB" dirty="0"/>
+              <a:t>Sparse GP:</a:t>
+            </a:r>
+          </a:p>
+          <a:p>
+            <a:pPr marL="0" marR="0" lvl="0" indent="0" algn="l" defTabSz="914400" rtl="0" eaLnBrk="1" fontAlgn="auto" latinLnBrk="0" hangingPunct="1">
+              <a:lnSpc>
+                <a:spcPct val="100000"/>
+              </a:lnSpc>
+              <a:spcBef>
+                <a:spcPts val="0"/>
+              </a:spcBef>
+              <a:spcAft>
+                <a:spcPts val="0"/>
+              </a:spcAft>
+              <a:buClrTx/>
+              <a:buSzTx/>
+              <a:buFontTx/>
+              <a:buNone/>
+              <a:tabLst/>
+              <a:defRPr/>
+            </a:pPr>
+            <a:r>
+              <a:rPr lang="en-US" sz="1200" dirty="0"/>
+              <a:t>Can </a:t>
+            </a:r>
+            <a:r>
+              <a:rPr lang="en-US" sz="1200" dirty="0" err="1"/>
+              <a:t>optimise</a:t>
+            </a:r>
+            <a:r>
+              <a:rPr lang="en-US" sz="1200" dirty="0"/>
+              <a:t> for where these pseudo-data are to get best approximate posterior distribution</a:t>
+            </a:r>
+          </a:p>
+          <a:p>
+            <a:pPr marL="0" marR="0" lvl="0" indent="0" algn="l" defTabSz="914400" rtl="0" eaLnBrk="1" fontAlgn="auto" latinLnBrk="0" hangingPunct="1">
+              <a:lnSpc>
+                <a:spcPct val="100000"/>
+              </a:lnSpc>
+              <a:spcBef>
+                <a:spcPts val="0"/>
+              </a:spcBef>
+              <a:spcAft>
+                <a:spcPts val="0"/>
+              </a:spcAft>
+              <a:buClrTx/>
+              <a:buSzTx/>
+              <a:buFontTx/>
+              <a:buNone/>
+              <a:tabLst/>
+              <a:defRPr/>
+            </a:pPr>
+            <a:endParaRPr lang="en-US" sz="1200" dirty="0"/>
+          </a:p>
+          <a:p>
+            <a:pPr marL="0" marR="0" lvl="0" indent="0" algn="l" defTabSz="914400" rtl="0" eaLnBrk="1" fontAlgn="auto" latinLnBrk="0" hangingPunct="1">
+              <a:lnSpc>
+                <a:spcPct val="100000"/>
+              </a:lnSpc>
+              <a:spcBef>
+                <a:spcPts val="0"/>
+              </a:spcBef>
+              <a:spcAft>
+                <a:spcPts val="0"/>
+              </a:spcAft>
+              <a:buClrTx/>
+              <a:buSzTx/>
+              <a:buFontTx/>
+              <a:buNone/>
+              <a:tabLst/>
+              <a:defRPr/>
+            </a:pPr>
+            <a:r>
+              <a:rPr lang="en-US" sz="1200" dirty="0"/>
+              <a:t>Multi-fidelity GP:</a:t>
+            </a:r>
+          </a:p>
+          <a:p>
+            <a:pPr marL="0" marR="0" lvl="0" indent="0" algn="l" defTabSz="914400" rtl="0" eaLnBrk="1" fontAlgn="auto" latinLnBrk="0" hangingPunct="1">
+              <a:lnSpc>
+                <a:spcPct val="100000"/>
+              </a:lnSpc>
+              <a:spcBef>
+                <a:spcPts val="0"/>
+              </a:spcBef>
+              <a:spcAft>
+                <a:spcPts val="0"/>
+              </a:spcAft>
+              <a:buClrTx/>
+              <a:buSzTx/>
+              <a:buFontTx/>
+              <a:buNone/>
+              <a:tabLst/>
+              <a:defRPr/>
+            </a:pPr>
+            <a:r>
+              <a:rPr lang="en-US" sz="1200" dirty="0"/>
+              <a:t>Low fidelity GP model, related high fidelity GP model, combine training – joint GP distributions</a:t>
+            </a:r>
+          </a:p>
+          <a:p>
+            <a:pPr marL="0" marR="0" lvl="0" indent="0" algn="l" defTabSz="914400" rtl="0" eaLnBrk="1" fontAlgn="auto" latinLnBrk="0" hangingPunct="1">
+              <a:lnSpc>
+                <a:spcPct val="100000"/>
+              </a:lnSpc>
+              <a:spcBef>
+                <a:spcPts val="0"/>
+              </a:spcBef>
+              <a:spcAft>
+                <a:spcPts val="0"/>
+              </a:spcAft>
+              <a:buClrTx/>
+              <a:buSzTx/>
+              <a:buFontTx/>
+              <a:buNone/>
+              <a:tabLst/>
+              <a:defRPr/>
+            </a:pPr>
+            <a:r>
+              <a:rPr lang="en-US" sz="1200" dirty="0"/>
+              <a:t>Estimate structure with beams, coarser FEM meshes etc. to do faster calcs</a:t>
+            </a:r>
+          </a:p>
+          <a:p>
+            <a:endParaRPr lang="en-GB" dirty="0"/>
+          </a:p>
+          <a:p>
+            <a:r>
+              <a:rPr lang="en-GB" dirty="0"/>
+              <a:t>Different approaches to handle high-dimensional space, large calculations</a:t>
             </a:r>
           </a:p>
         </p:txBody>
@@ -1647,7 +1768,7 @@
     </p:spTree>
     <p:extLst>
       <p:ext uri="{BB962C8B-B14F-4D97-AF65-F5344CB8AC3E}">
-        <p14:creationId xmlns:p14="http://schemas.microsoft.com/office/powerpoint/2010/main" val="3142472496"/>
+        <p14:creationId xmlns:p14="http://schemas.microsoft.com/office/powerpoint/2010/main" val="4104965006"/>
       </p:ext>
     </p:extLst>
   </p:cSld>
@@ -1703,7 +1824,7 @@
           <a:p>
             <a:r>
               <a:rPr lang="en-GB" dirty="0"/>
-              <a:t>Multi-fidelity GP</a:t>
+              <a:t>Sparse GP</a:t>
             </a:r>
           </a:p>
         </p:txBody>
@@ -1734,7 +1855,7 @@
     </p:spTree>
     <p:extLst>
       <p:ext uri="{BB962C8B-B14F-4D97-AF65-F5344CB8AC3E}">
-        <p14:creationId xmlns:p14="http://schemas.microsoft.com/office/powerpoint/2010/main" val="4257190783"/>
+        <p14:creationId xmlns:p14="http://schemas.microsoft.com/office/powerpoint/2010/main" val="3142472496"/>
       </p:ext>
     </p:extLst>
   </p:cSld>
@@ -1914,7 +2035,7 @@
           <a:p>
             <a:fld id="{75A6CA30-8F9C-5C44-B8C9-9A98D08A952F}" type="datetimeFigureOut">
               <a:rPr lang="en-US" smtClean="0"/>
-              <a:t>11/24/20</a:t>
+              <a:t>11/26/20</a:t>
             </a:fld>
             <a:endParaRPr lang="en-US"/>
           </a:p>
@@ -2181,7 +2302,7 @@
           <a:p>
             <a:fld id="{75A6CA30-8F9C-5C44-B8C9-9A98D08A952F}" type="datetimeFigureOut">
               <a:rPr lang="en-US" smtClean="0"/>
-              <a:t>11/24/20</a:t>
+              <a:t>11/26/20</a:t>
             </a:fld>
             <a:endParaRPr lang="en-US"/>
           </a:p>
@@ -2412,7 +2533,7 @@
           <a:p>
             <a:fld id="{75A6CA30-8F9C-5C44-B8C9-9A98D08A952F}" type="datetimeFigureOut">
               <a:rPr lang="en-US" smtClean="0"/>
-              <a:t>11/24/20</a:t>
+              <a:t>11/26/20</a:t>
             </a:fld>
             <a:endParaRPr lang="en-US"/>
           </a:p>
@@ -2722,7 +2843,7 @@
           <a:p>
             <a:fld id="{75A6CA30-8F9C-5C44-B8C9-9A98D08A952F}" type="datetimeFigureOut">
               <a:rPr lang="en-US" smtClean="0"/>
-              <a:t>11/24/20</a:t>
+              <a:t>11/26/20</a:t>
             </a:fld>
             <a:endParaRPr lang="en-US"/>
           </a:p>
@@ -3195,7 +3316,7 @@
           <a:p>
             <a:fld id="{75A6CA30-8F9C-5C44-B8C9-9A98D08A952F}" type="datetimeFigureOut">
               <a:rPr lang="en-US" smtClean="0"/>
-              <a:t>11/24/20</a:t>
+              <a:t>11/26/20</a:t>
             </a:fld>
             <a:endParaRPr lang="en-US"/>
           </a:p>
@@ -3742,7 +3863,7 @@
           <a:p>
             <a:fld id="{75A6CA30-8F9C-5C44-B8C9-9A98D08A952F}" type="datetimeFigureOut">
               <a:rPr lang="en-US" smtClean="0"/>
-              <a:t>11/24/20</a:t>
+              <a:t>11/26/20</a:t>
             </a:fld>
             <a:endParaRPr lang="en-US"/>
           </a:p>
@@ -4516,7 +4637,7 @@
           <a:p>
             <a:fld id="{75A6CA30-8F9C-5C44-B8C9-9A98D08A952F}" type="datetimeFigureOut">
               <a:rPr lang="en-US" smtClean="0"/>
-              <a:t>11/24/20</a:t>
+              <a:t>11/26/20</a:t>
             </a:fld>
             <a:endParaRPr lang="en-US"/>
           </a:p>
@@ -4691,7 +4812,7 @@
           <a:p>
             <a:fld id="{75A6CA30-8F9C-5C44-B8C9-9A98D08A952F}" type="datetimeFigureOut">
               <a:rPr lang="en-US" smtClean="0"/>
-              <a:t>11/24/20</a:t>
+              <a:t>11/26/20</a:t>
             </a:fld>
             <a:endParaRPr lang="en-US"/>
           </a:p>
@@ -4914,7 +5035,7 @@
           <a:p>
             <a:fld id="{75A6CA30-8F9C-5C44-B8C9-9A98D08A952F}" type="datetimeFigureOut">
               <a:rPr lang="en-US" smtClean="0"/>
-              <a:t>11/24/20</a:t>
+              <a:t>11/26/20</a:t>
             </a:fld>
             <a:endParaRPr lang="en-US"/>
           </a:p>
@@ -5335,7 +5456,7 @@
           <a:p>
             <a:fld id="{75A6CA30-8F9C-5C44-B8C9-9A98D08A952F}" type="datetimeFigureOut">
               <a:rPr lang="en-US" smtClean="0"/>
-              <a:t>11/24/20</a:t>
+              <a:t>11/26/20</a:t>
             </a:fld>
             <a:endParaRPr lang="en-US"/>
           </a:p>
@@ -5528,7 +5649,7 @@
           <a:p>
             <a:fld id="{75A6CA30-8F9C-5C44-B8C9-9A98D08A952F}" type="datetimeFigureOut">
               <a:rPr lang="en-US" smtClean="0"/>
-              <a:t>11/24/20</a:t>
+              <a:t>11/26/20</a:t>
             </a:fld>
             <a:endParaRPr lang="en-US"/>
           </a:p>
@@ -5817,7 +5938,7 @@
           <a:p>
             <a:fld id="{75A6CA30-8F9C-5C44-B8C9-9A98D08A952F}" type="datetimeFigureOut">
               <a:rPr lang="en-US" smtClean="0"/>
-              <a:t>11/24/20</a:t>
+              <a:t>11/26/20</a:t>
             </a:fld>
             <a:endParaRPr lang="en-US"/>
           </a:p>
@@ -6059,7 +6180,7 @@
           <a:p>
             <a:fld id="{75A6CA30-8F9C-5C44-B8C9-9A98D08A952F}" type="datetimeFigureOut">
               <a:rPr lang="en-US" smtClean="0"/>
-              <a:t>11/24/20</a:t>
+              <a:t>11/26/20</a:t>
             </a:fld>
             <a:endParaRPr lang="en-US"/>
           </a:p>
@@ -6438,7 +6559,7 @@
           <a:p>
             <a:fld id="{75A6CA30-8F9C-5C44-B8C9-9A98D08A952F}" type="datetimeFigureOut">
               <a:rPr lang="en-US" smtClean="0"/>
-              <a:t>11/24/20</a:t>
+              <a:t>11/26/20</a:t>
             </a:fld>
             <a:endParaRPr lang="en-US"/>
           </a:p>
@@ -6556,7 +6677,7 @@
           <a:p>
             <a:fld id="{75A6CA30-8F9C-5C44-B8C9-9A98D08A952F}" type="datetimeFigureOut">
               <a:rPr lang="en-US" smtClean="0"/>
-              <a:t>11/24/20</a:t>
+              <a:t>11/26/20</a:t>
             </a:fld>
             <a:endParaRPr lang="en-US"/>
           </a:p>
@@ -6651,7 +6772,7 @@
           <a:p>
             <a:fld id="{75A6CA30-8F9C-5C44-B8C9-9A98D08A952F}" type="datetimeFigureOut">
               <a:rPr lang="en-US" smtClean="0"/>
-              <a:t>11/24/20</a:t>
+              <a:t>11/26/20</a:t>
             </a:fld>
             <a:endParaRPr lang="en-US"/>
           </a:p>
@@ -6900,7 +7021,7 @@
           <a:p>
             <a:fld id="{75A6CA30-8F9C-5C44-B8C9-9A98D08A952F}" type="datetimeFigureOut">
               <a:rPr lang="en-US" smtClean="0"/>
-              <a:t>11/24/20</a:t>
+              <a:t>11/26/20</a:t>
             </a:fld>
             <a:endParaRPr lang="en-US"/>
           </a:p>
@@ -7157,7 +7278,7 @@
           <a:p>
             <a:fld id="{75A6CA30-8F9C-5C44-B8C9-9A98D08A952F}" type="datetimeFigureOut">
               <a:rPr lang="en-US" smtClean="0"/>
-              <a:t>11/24/20</a:t>
+              <a:t>11/26/20</a:t>
             </a:fld>
             <a:endParaRPr lang="en-US"/>
           </a:p>
@@ -7400,7 +7521,7 @@
           <a:p>
             <a:fld id="{75A6CA30-8F9C-5C44-B8C9-9A98D08A952F}" type="datetimeFigureOut">
               <a:rPr lang="en-US" smtClean="0"/>
-              <a:t>11/24/20</a:t>
+              <a:t>11/26/20</a:t>
             </a:fld>
             <a:endParaRPr lang="en-US"/>
           </a:p>
@@ -7933,6 +8054,148 @@
 <file path=ppt/slides/slide10.xml><?xml version="1.0" encoding="utf-8"?>
 <p:sld xmlns:a="http://schemas.openxmlformats.org/drawingml/2006/main" xmlns:r="http://schemas.openxmlformats.org/officeDocument/2006/relationships" xmlns:p="http://schemas.openxmlformats.org/presentationml/2006/main">
   <p:cSld>
+    <p:bg>
+      <p:bgPr>
+        <a:solidFill>
+          <a:schemeClr val="bg1"/>
+        </a:solidFill>
+        <a:effectLst/>
+      </p:bgPr>
+    </p:bg>
+    <p:spTree>
+      <p:nvGrpSpPr>
+        <p:cNvPr id="1" name=""/>
+        <p:cNvGrpSpPr/>
+        <p:nvPr/>
+      </p:nvGrpSpPr>
+      <p:grpSpPr>
+        <a:xfrm>
+          <a:off x="0" y="0"/>
+          <a:ext cx="0" cy="0"/>
+          <a:chOff x="0" y="0"/>
+          <a:chExt cx="0" cy="0"/>
+        </a:xfrm>
+      </p:grpSpPr>
+      <p:sp>
+        <p:nvSpPr>
+          <p:cNvPr id="7" name="Rounded Rectangle 11">
+            <a:extLst>
+              <a:ext uri="{FF2B5EF4-FFF2-40B4-BE49-F238E27FC236}">
+                <a16:creationId xmlns:a16="http://schemas.microsoft.com/office/drawing/2014/main" id="{2770B5F4-AED0-4A3A-859D-B6239ED38A3B}"/>
+              </a:ext>
+              <a:ext uri="{C183D7F6-B498-43B3-948B-1728B52AA6E4}">
+                <adec:decorative xmlns:adec="http://schemas.microsoft.com/office/drawing/2017/decorative" val="1"/>
+              </a:ext>
+            </a:extLst>
+          </p:cNvPr>
+          <p:cNvSpPr>
+            <a:spLocks noGrp="1" noRot="1" noChangeAspect="1" noMove="1" noResize="1" noEditPoints="1" noAdjustHandles="1" noChangeArrowheads="1" noChangeShapeType="1" noTextEdit="1"/>
+          </p:cNvSpPr>
+          <p:nvPr>
+            <p:extLst>
+              <p:ext uri="{386F3935-93C4-4BCD-93E2-E3B085C9AB24}">
+                <p16:designElem xmlns:p16="http://schemas.microsoft.com/office/powerpoint/2015/main" val="1"/>
+              </p:ext>
+            </p:extLst>
+          </p:nvPr>
+        </p:nvSpPr>
+        <p:spPr>
+          <a:xfrm>
+            <a:off x="643403" y="643464"/>
+            <a:ext cx="10905195" cy="5571072"/>
+          </a:xfrm>
+          <a:prstGeom prst="roundRect">
+            <a:avLst>
+              <a:gd name="adj" fmla="val 2403"/>
+            </a:avLst>
+          </a:prstGeom>
+          <a:solidFill>
+            <a:srgbClr val="FFFFFF"/>
+          </a:solidFill>
+          <a:ln>
+            <a:noFill/>
+          </a:ln>
+          <a:effectLst>
+            <a:innerShdw blurRad="114300">
+              <a:prstClr val="black"/>
+            </a:innerShdw>
+          </a:effectLst>
+        </p:spPr>
+        <p:style>
+          <a:lnRef idx="2">
+            <a:schemeClr val="accent1">
+              <a:shade val="50000"/>
+            </a:schemeClr>
+          </a:lnRef>
+          <a:fillRef idx="1">
+            <a:schemeClr val="accent1"/>
+          </a:fillRef>
+          <a:effectRef idx="0">
+            <a:schemeClr val="accent1"/>
+          </a:effectRef>
+          <a:fontRef idx="minor">
+            <a:schemeClr val="lt1"/>
+          </a:fontRef>
+        </p:style>
+        <p:txBody>
+          <a:bodyPr rtlCol="0" anchor="ctr"/>
+          <a:lstStyle/>
+          <a:p>
+            <a:pPr algn="ctr"/>
+            <a:endParaRPr lang="en-US"/>
+          </a:p>
+        </p:txBody>
+      </p:sp>
+      <p:pic>
+        <p:nvPicPr>
+          <p:cNvPr id="2" name="Picture 1" descr="Chart, line chart&#10;&#10;Description automatically generated">
+            <a:hlinkClick r:id="rId3"/>
+            <a:extLst>
+              <a:ext uri="{FF2B5EF4-FFF2-40B4-BE49-F238E27FC236}">
+                <a16:creationId xmlns:a16="http://schemas.microsoft.com/office/drawing/2014/main" id="{4501EB8F-B88A-BF4B-BEF9-A1AE2E490EEF}"/>
+              </a:ext>
+            </a:extLst>
+          </p:cNvPr>
+          <p:cNvPicPr>
+            <a:picLocks noChangeAspect="1"/>
+          </p:cNvPicPr>
+          <p:nvPr/>
+        </p:nvPicPr>
+        <p:blipFill rotWithShape="1">
+          <a:blip r:embed="rId4"/>
+          <a:srcRect t="5273"/>
+          <a:stretch/>
+        </p:blipFill>
+        <p:spPr>
+          <a:xfrm>
+            <a:off x="1363131" y="873252"/>
+            <a:ext cx="9465738" cy="5111496"/>
+          </a:xfrm>
+          <a:prstGeom prst="rect">
+            <a:avLst/>
+          </a:prstGeom>
+          <a:ln w="31750" cap="sq">
+            <a:noFill/>
+            <a:miter lim="800000"/>
+          </a:ln>
+        </p:spPr>
+      </p:pic>
+    </p:spTree>
+    <p:extLst>
+      <p:ext uri="{BB962C8B-B14F-4D97-AF65-F5344CB8AC3E}">
+        <p14:creationId xmlns:p14="http://schemas.microsoft.com/office/powerpoint/2010/main" val="1153423290"/>
+      </p:ext>
+    </p:extLst>
+  </p:cSld>
+  <p:clrMapOvr>
+    <a:masterClrMapping/>
+  </p:clrMapOvr>
+</p:sld>
+</file>
+
+<file path=ppt/slides/slide11.xml><?xml version="1.0" encoding="utf-8"?>
+<p:sld xmlns:a="http://schemas.openxmlformats.org/drawingml/2006/main" xmlns:r="http://schemas.openxmlformats.org/officeDocument/2006/relationships" xmlns:p="http://schemas.openxmlformats.org/presentationml/2006/main">
+  <p:cSld>
     <p:spTree>
       <p:nvGrpSpPr>
         <p:cNvPr id="1" name=""/>
@@ -8307,7 +8570,7 @@
         </p:blipFill>
         <p:spPr bwMode="auto">
           <a:xfrm>
-            <a:off x="870204" y="1338681"/>
+            <a:off x="870204" y="718434"/>
             <a:ext cx="10451592" cy="4180638"/>
           </a:xfrm>
           <a:prstGeom prst="rect">
@@ -8329,6 +8592,53 @@
           </a:extLst>
         </p:spPr>
       </p:pic>
+      <p:sp>
+        <p:nvSpPr>
+          <p:cNvPr id="3" name="TextBox 2">
+            <a:extLst>
+              <a:ext uri="{FF2B5EF4-FFF2-40B4-BE49-F238E27FC236}">
+                <a16:creationId xmlns:a16="http://schemas.microsoft.com/office/drawing/2014/main" id="{6B1CBD0D-A0F7-5645-9178-A7F3951AA817}"/>
+              </a:ext>
+            </a:extLst>
+          </p:cNvPr>
+          <p:cNvSpPr txBox="1"/>
+          <p:nvPr/>
+        </p:nvSpPr>
+        <p:spPr>
+          <a:xfrm>
+            <a:off x="1648691" y="5216236"/>
+            <a:ext cx="8894618" cy="923330"/>
+          </a:xfrm>
+          <a:prstGeom prst="rect">
+            <a:avLst/>
+          </a:prstGeom>
+          <a:noFill/>
+        </p:spPr>
+        <p:txBody>
+          <a:bodyPr wrap="square" rtlCol="0">
+            <a:spAutoFit/>
+          </a:bodyPr>
+          <a:lstStyle/>
+          <a:p>
+            <a:r>
+              <a:rPr lang="en-GB" dirty="0"/>
+              <a:t>Size optimisation – vary radii of members in truss</a:t>
+            </a:r>
+          </a:p>
+          <a:p>
+            <a:r>
+              <a:rPr lang="en-GB" dirty="0"/>
+              <a:t>Shape optimisation – vary lengths/angles of polygons or shape type</a:t>
+            </a:r>
+          </a:p>
+          <a:p>
+            <a:r>
+              <a:rPr lang="en-GB" dirty="0"/>
+              <a:t>Topology optimisation – vary layout of material in predefined space</a:t>
+            </a:r>
+          </a:p>
+        </p:txBody>
+      </p:sp>
     </p:spTree>
     <p:extLst>
       <p:ext uri="{BB962C8B-B14F-4D97-AF65-F5344CB8AC3E}">
@@ -8833,332 +9143,6 @@
 <file path=ppt/slides/slide7.xml><?xml version="1.0" encoding="utf-8"?>
 <p:sld xmlns:a="http://schemas.openxmlformats.org/drawingml/2006/main" xmlns:r="http://schemas.openxmlformats.org/officeDocument/2006/relationships" xmlns:p="http://schemas.openxmlformats.org/presentationml/2006/main">
   <p:cSld>
-    <p:spTree>
-      <p:nvGrpSpPr>
-        <p:cNvPr id="1" name=""/>
-        <p:cNvGrpSpPr/>
-        <p:nvPr/>
-      </p:nvGrpSpPr>
-      <p:grpSpPr>
-        <a:xfrm>
-          <a:off x="0" y="0"/>
-          <a:ext cx="0" cy="0"/>
-          <a:chOff x="0" y="0"/>
-          <a:chExt cx="0" cy="0"/>
-        </a:xfrm>
-      </p:grpSpPr>
-      <p:sp>
-        <p:nvSpPr>
-          <p:cNvPr id="6" name="Text Placeholder 5">
-            <a:extLst>
-              <a:ext uri="{FF2B5EF4-FFF2-40B4-BE49-F238E27FC236}">
-                <a16:creationId xmlns:a16="http://schemas.microsoft.com/office/drawing/2014/main" id="{E9176825-3B62-3E4B-8B2E-4AC0DA3FB591}"/>
-              </a:ext>
-            </a:extLst>
-          </p:cNvPr>
-          <p:cNvSpPr>
-            <a:spLocks noGrp="1"/>
-          </p:cNvSpPr>
-          <p:nvPr>
-            <p:ph type="body" idx="1"/>
-          </p:nvPr>
-        </p:nvSpPr>
-        <p:spPr/>
-        <p:txBody>
-          <a:bodyPr>
-            <a:normAutofit/>
-          </a:bodyPr>
-          <a:lstStyle/>
-          <a:p>
-            <a:r>
-              <a:rPr lang="en-US" sz="2800" dirty="0"/>
-              <a:t>Difficulties</a:t>
-            </a:r>
-          </a:p>
-        </p:txBody>
-      </p:sp>
-      <p:sp>
-        <p:nvSpPr>
-          <p:cNvPr id="7" name="Content Placeholder 6">
-            <a:extLst>
-              <a:ext uri="{FF2B5EF4-FFF2-40B4-BE49-F238E27FC236}">
-                <a16:creationId xmlns:a16="http://schemas.microsoft.com/office/drawing/2014/main" id="{AE482908-472E-514C-806A-38281CE2195E}"/>
-              </a:ext>
-            </a:extLst>
-          </p:cNvPr>
-          <p:cNvSpPr>
-            <a:spLocks noGrp="1"/>
-          </p:cNvSpPr>
-          <p:nvPr>
-            <p:ph sz="half" idx="2"/>
-          </p:nvPr>
-        </p:nvSpPr>
-        <p:spPr/>
-        <p:txBody>
-          <a:bodyPr>
-            <a:noAutofit/>
-          </a:bodyPr>
-          <a:lstStyle/>
-          <a:p>
-            <a:r>
-              <a:rPr lang="en-US" dirty="0"/>
-              <a:t>Gaussian Process posterior (and predictive distribution) has a term which requires calculating [K(</a:t>
-            </a:r>
-            <a:r>
-              <a:rPr lang="en-US" dirty="0" err="1"/>
-              <a:t>x,x</a:t>
-            </a:r>
-            <a:r>
-              <a:rPr lang="en-US" dirty="0"/>
-              <a:t>)+</a:t>
-            </a:r>
-            <a:r>
-              <a:rPr lang="en-US" dirty="0" err="1"/>
-              <a:t>σ</a:t>
-            </a:r>
-            <a:r>
-              <a:rPr lang="en-US" baseline="-25000" dirty="0" err="1"/>
-              <a:t>noise</a:t>
-            </a:r>
-            <a:r>
-              <a:rPr lang="en-US" dirty="0"/>
-              <a:t> I]</a:t>
-            </a:r>
-            <a:r>
-              <a:rPr lang="en-US" baseline="30000" dirty="0"/>
-              <a:t>-1</a:t>
-            </a:r>
-          </a:p>
-          <a:p>
-            <a:pPr lvl="1"/>
-            <a:r>
-              <a:rPr lang="en-US" dirty="0"/>
-              <a:t>O(N</a:t>
-            </a:r>
-            <a:r>
-              <a:rPr lang="en-US" baseline="30000" dirty="0"/>
-              <a:t>3</a:t>
-            </a:r>
-            <a:r>
-              <a:rPr lang="en-US" dirty="0"/>
-              <a:t>) calculation</a:t>
-            </a:r>
-          </a:p>
-          <a:p>
-            <a:pPr lvl="1"/>
-            <a:r>
-              <a:rPr lang="en-US" dirty="0" err="1"/>
-              <a:t>Optimisation</a:t>
-            </a:r>
-            <a:r>
-              <a:rPr lang="en-US" dirty="0"/>
-              <a:t> takes long time if lots of high dim data points</a:t>
-            </a:r>
-          </a:p>
-          <a:p>
-            <a:r>
-              <a:rPr lang="en-US" dirty="0"/>
-              <a:t>FEM models can take very long to run, difficult to get lots/enough data points to fit GP</a:t>
-            </a:r>
-          </a:p>
-          <a:p>
-            <a:pPr marL="0" indent="0">
-              <a:buNone/>
-            </a:pPr>
-            <a:endParaRPr lang="en-US" dirty="0"/>
-          </a:p>
-          <a:p>
-            <a:endParaRPr lang="en-US" dirty="0" err="1"/>
-          </a:p>
-        </p:txBody>
-      </p:sp>
-      <p:sp>
-        <p:nvSpPr>
-          <p:cNvPr id="8" name="Text Placeholder 7">
-            <a:extLst>
-              <a:ext uri="{FF2B5EF4-FFF2-40B4-BE49-F238E27FC236}">
-                <a16:creationId xmlns:a16="http://schemas.microsoft.com/office/drawing/2014/main" id="{100B022F-E9AE-4B49-86B8-C909789DF50A}"/>
-              </a:ext>
-            </a:extLst>
-          </p:cNvPr>
-          <p:cNvSpPr>
-            <a:spLocks noGrp="1"/>
-          </p:cNvSpPr>
-          <p:nvPr>
-            <p:ph type="body" sz="quarter" idx="3"/>
-          </p:nvPr>
-        </p:nvSpPr>
-        <p:spPr/>
-        <p:txBody>
-          <a:bodyPr>
-            <a:normAutofit/>
-          </a:bodyPr>
-          <a:lstStyle/>
-          <a:p>
-            <a:r>
-              <a:rPr lang="en-US" sz="2800" dirty="0"/>
-              <a:t>Solutions</a:t>
-            </a:r>
-          </a:p>
-        </p:txBody>
-      </p:sp>
-      <p:sp>
-        <p:nvSpPr>
-          <p:cNvPr id="9" name="Content Placeholder 8">
-            <a:extLst>
-              <a:ext uri="{FF2B5EF4-FFF2-40B4-BE49-F238E27FC236}">
-                <a16:creationId xmlns:a16="http://schemas.microsoft.com/office/drawing/2014/main" id="{C01A27EB-612F-1A47-AFEA-9BCACBDBA57B}"/>
-              </a:ext>
-            </a:extLst>
-          </p:cNvPr>
-          <p:cNvSpPr>
-            <a:spLocks noGrp="1"/>
-          </p:cNvSpPr>
-          <p:nvPr>
-            <p:ph sz="quarter" idx="4"/>
-          </p:nvPr>
-        </p:nvSpPr>
-        <p:spPr>
-          <a:xfrm>
-            <a:off x="6364224" y="2743199"/>
-            <a:ext cx="4754880" cy="3640975"/>
-          </a:xfrm>
-        </p:spPr>
-        <p:txBody>
-          <a:bodyPr>
-            <a:noAutofit/>
-          </a:bodyPr>
-          <a:lstStyle/>
-          <a:p>
-            <a:r>
-              <a:rPr lang="en-US" dirty="0"/>
-              <a:t>Sparse GP</a:t>
-            </a:r>
-          </a:p>
-          <a:p>
-            <a:pPr lvl="1"/>
-            <a:r>
-              <a:rPr lang="en-US" sz="2000" dirty="0" err="1"/>
-              <a:t>Summarise</a:t>
-            </a:r>
-            <a:r>
-              <a:rPr lang="en-US" sz="2000" dirty="0"/>
-              <a:t> large dataset with a smaller number of pseudo-data</a:t>
-            </a:r>
-          </a:p>
-          <a:p>
-            <a:pPr lvl="1"/>
-            <a:r>
-              <a:rPr lang="en-US" sz="2000" dirty="0"/>
-              <a:t>Reduce complexity to O(N</a:t>
-            </a:r>
-            <a:r>
-              <a:rPr lang="en-US" sz="2000" baseline="30000" dirty="0"/>
-              <a:t>2</a:t>
-            </a:r>
-            <a:r>
-              <a:rPr lang="en-US" sz="2000" dirty="0"/>
-              <a:t>M)</a:t>
-            </a:r>
-          </a:p>
-          <a:p>
-            <a:r>
-              <a:rPr lang="en-US" dirty="0"/>
-              <a:t>Multi-fidelity GP</a:t>
-            </a:r>
-          </a:p>
-          <a:p>
-            <a:pPr lvl="1"/>
-            <a:r>
-              <a:rPr lang="en-US" dirty="0"/>
-              <a:t>Take many samples from cheap to evaluate f</a:t>
-            </a:r>
-            <a:r>
-              <a:rPr lang="en-US" baseline="-25000" dirty="0"/>
-              <a:t>1</a:t>
-            </a:r>
-            <a:r>
-              <a:rPr lang="en-US" dirty="0"/>
-              <a:t>(x) and few samples from expensive f</a:t>
-            </a:r>
-            <a:r>
-              <a:rPr lang="en-US" baseline="-25000" dirty="0"/>
-              <a:t>2</a:t>
-            </a:r>
-            <a:r>
-              <a:rPr lang="en-US" dirty="0"/>
-              <a:t>(x)</a:t>
-            </a:r>
-          </a:p>
-          <a:p>
-            <a:pPr lvl="1"/>
-            <a:r>
-              <a:rPr lang="en-US" dirty="0"/>
-              <a:t>Combined training and prediction to get better estimation of high-fidelity f</a:t>
-            </a:r>
-            <a:r>
-              <a:rPr lang="en-US" baseline="-25000" dirty="0"/>
-              <a:t>2</a:t>
-            </a:r>
-            <a:r>
-              <a:rPr lang="en-US" dirty="0"/>
-              <a:t>(x)</a:t>
-            </a:r>
-          </a:p>
-        </p:txBody>
-      </p:sp>
-      <p:sp>
-        <p:nvSpPr>
-          <p:cNvPr id="2" name="Title 1">
-            <a:extLst>
-              <a:ext uri="{FF2B5EF4-FFF2-40B4-BE49-F238E27FC236}">
-                <a16:creationId xmlns:a16="http://schemas.microsoft.com/office/drawing/2014/main" id="{DC4FC240-EBD0-2644-8BF3-9B5428807654}"/>
-              </a:ext>
-            </a:extLst>
-          </p:cNvPr>
-          <p:cNvSpPr>
-            <a:spLocks noGrp="1"/>
-          </p:cNvSpPr>
-          <p:nvPr>
-            <p:ph type="title"/>
-          </p:nvPr>
-        </p:nvSpPr>
-        <p:spPr/>
-        <p:txBody>
-          <a:bodyPr/>
-          <a:lstStyle/>
-          <a:p>
-            <a:r>
-              <a:rPr lang="en-GB" dirty="0"/>
-              <a:t>improving</a:t>
-            </a:r>
-            <a:r>
-              <a:rPr lang="en-US" dirty="0"/>
-              <a:t> the </a:t>
-            </a:r>
-            <a:r>
-              <a:rPr lang="en-GB" dirty="0"/>
-              <a:t>Optimisation</a:t>
-            </a:r>
-          </a:p>
-        </p:txBody>
-      </p:sp>
-    </p:spTree>
-    <p:extLst>
-      <p:ext uri="{BB962C8B-B14F-4D97-AF65-F5344CB8AC3E}">
-        <p14:creationId xmlns:p14="http://schemas.microsoft.com/office/powerpoint/2010/main" val="1604994096"/>
-      </p:ext>
-    </p:extLst>
-  </p:cSld>
-  <p:clrMapOvr>
-    <a:masterClrMapping/>
-  </p:clrMapOvr>
-</p:sld>
-</file>
-
-<file path=ppt/slides/slide8.xml><?xml version="1.0" encoding="utf-8"?>
-<p:sld xmlns:a="http://schemas.openxmlformats.org/drawingml/2006/main" xmlns:r="http://schemas.openxmlformats.org/officeDocument/2006/relationships" xmlns:p="http://schemas.openxmlformats.org/presentationml/2006/main">
-  <p:cSld>
     <p:bg>
       <p:bgPr>
         <a:solidFill>
@@ -9183,7 +9167,7 @@
       </p:grpSpPr>
       <p:sp>
         <p:nvSpPr>
-          <p:cNvPr id="1028" name="Rounded Rectangle 11">
+          <p:cNvPr id="71" name="Rounded Rectangle 11">
             <a:extLst>
               <a:ext uri="{FF2B5EF4-FFF2-40B4-BE49-F238E27FC236}">
                 <a16:creationId xmlns:a16="http://schemas.microsoft.com/office/drawing/2014/main" id="{2770B5F4-AED0-4A3A-859D-B6239ED38A3B}"/>
@@ -9253,11 +9237,10 @@
       </p:sp>
       <p:pic>
         <p:nvPicPr>
-          <p:cNvPr id="1026" name="Picture 2" descr="PDF] Online Sparse Gaussian Process Training with Input Noise | Semantic  Scholar">
-            <a:hlinkClick r:id="rId3"/>
+          <p:cNvPr id="1026" name="Picture 2" descr="Bayesian Hyperparameter Optimization | by Matti Karppanen | Towards Data  Science">
             <a:extLst>
               <a:ext uri="{FF2B5EF4-FFF2-40B4-BE49-F238E27FC236}">
-                <a16:creationId xmlns:a16="http://schemas.microsoft.com/office/drawing/2014/main" id="{CC18E571-DA11-2940-B9B8-9DBFABABAC89}"/>
+                <a16:creationId xmlns:a16="http://schemas.microsoft.com/office/drawing/2014/main" id="{FE3A1547-1BF6-0645-8DC3-5A0592977CAF}"/>
               </a:ext>
             </a:extLst>
           </p:cNvPr>
@@ -9267,7 +9250,7 @@
           <p:nvPr/>
         </p:nvPicPr>
         <p:blipFill>
-          <a:blip r:embed="rId4">
+          <a:blip r:embed="rId3">
             <a:extLst>
               <a:ext uri="{28A0092B-C50C-407E-A947-70E740481C1C}">
                 <a14:useLocalDpi xmlns:a14="http://schemas.microsoft.com/office/drawing/2010/main" val="0"/>
@@ -9280,8 +9263,8 @@
         </p:blipFill>
         <p:spPr bwMode="auto">
           <a:xfrm>
-            <a:off x="870204" y="1443197"/>
-            <a:ext cx="10451592" cy="3971605"/>
+            <a:off x="2309707" y="873252"/>
+            <a:ext cx="7572586" cy="5111496"/>
           </a:xfrm>
           <a:prstGeom prst="rect">
             <a:avLst/>
@@ -9305,7 +9288,333 @@
     </p:spTree>
     <p:extLst>
       <p:ext uri="{BB962C8B-B14F-4D97-AF65-F5344CB8AC3E}">
-        <p14:creationId xmlns:p14="http://schemas.microsoft.com/office/powerpoint/2010/main" val="698118470"/>
+        <p14:creationId xmlns:p14="http://schemas.microsoft.com/office/powerpoint/2010/main" val="2756315542"/>
+      </p:ext>
+    </p:extLst>
+  </p:cSld>
+  <p:clrMapOvr>
+    <a:masterClrMapping/>
+  </p:clrMapOvr>
+</p:sld>
+</file>
+
+<file path=ppt/slides/slide8.xml><?xml version="1.0" encoding="utf-8"?>
+<p:sld xmlns:a="http://schemas.openxmlformats.org/drawingml/2006/main" xmlns:r="http://schemas.openxmlformats.org/officeDocument/2006/relationships" xmlns:p="http://schemas.openxmlformats.org/presentationml/2006/main">
+  <p:cSld>
+    <p:spTree>
+      <p:nvGrpSpPr>
+        <p:cNvPr id="1" name=""/>
+        <p:cNvGrpSpPr/>
+        <p:nvPr/>
+      </p:nvGrpSpPr>
+      <p:grpSpPr>
+        <a:xfrm>
+          <a:off x="0" y="0"/>
+          <a:ext cx="0" cy="0"/>
+          <a:chOff x="0" y="0"/>
+          <a:chExt cx="0" cy="0"/>
+        </a:xfrm>
+      </p:grpSpPr>
+      <p:sp>
+        <p:nvSpPr>
+          <p:cNvPr id="6" name="Text Placeholder 5">
+            <a:extLst>
+              <a:ext uri="{FF2B5EF4-FFF2-40B4-BE49-F238E27FC236}">
+                <a16:creationId xmlns:a16="http://schemas.microsoft.com/office/drawing/2014/main" id="{E9176825-3B62-3E4B-8B2E-4AC0DA3FB591}"/>
+              </a:ext>
+            </a:extLst>
+          </p:cNvPr>
+          <p:cNvSpPr>
+            <a:spLocks noGrp="1"/>
+          </p:cNvSpPr>
+          <p:nvPr>
+            <p:ph type="body" idx="1"/>
+          </p:nvPr>
+        </p:nvSpPr>
+        <p:spPr/>
+        <p:txBody>
+          <a:bodyPr>
+            <a:normAutofit/>
+          </a:bodyPr>
+          <a:lstStyle/>
+          <a:p>
+            <a:r>
+              <a:rPr lang="en-US" sz="2800" dirty="0"/>
+              <a:t>Difficulties</a:t>
+            </a:r>
+          </a:p>
+        </p:txBody>
+      </p:sp>
+      <p:sp>
+        <p:nvSpPr>
+          <p:cNvPr id="7" name="Content Placeholder 6">
+            <a:extLst>
+              <a:ext uri="{FF2B5EF4-FFF2-40B4-BE49-F238E27FC236}">
+                <a16:creationId xmlns:a16="http://schemas.microsoft.com/office/drawing/2014/main" id="{AE482908-472E-514C-806A-38281CE2195E}"/>
+              </a:ext>
+            </a:extLst>
+          </p:cNvPr>
+          <p:cNvSpPr>
+            <a:spLocks noGrp="1"/>
+          </p:cNvSpPr>
+          <p:nvPr>
+            <p:ph sz="half" idx="2"/>
+          </p:nvPr>
+        </p:nvSpPr>
+        <p:spPr/>
+        <p:txBody>
+          <a:bodyPr>
+            <a:noAutofit/>
+          </a:bodyPr>
+          <a:lstStyle/>
+          <a:p>
+            <a:r>
+              <a:rPr lang="en-US" dirty="0"/>
+              <a:t>Gaussian Process posterior (and predictive distribution) has a term which requires calculating [K(</a:t>
+            </a:r>
+            <a:r>
+              <a:rPr lang="en-US" dirty="0" err="1"/>
+              <a:t>x,x</a:t>
+            </a:r>
+            <a:r>
+              <a:rPr lang="en-US" dirty="0"/>
+              <a:t>)+</a:t>
+            </a:r>
+            <a:r>
+              <a:rPr lang="en-US" dirty="0" err="1"/>
+              <a:t>σ</a:t>
+            </a:r>
+            <a:r>
+              <a:rPr lang="en-US" baseline="-25000" dirty="0" err="1"/>
+              <a:t>noise</a:t>
+            </a:r>
+            <a:r>
+              <a:rPr lang="en-US" dirty="0"/>
+              <a:t> I]</a:t>
+            </a:r>
+            <a:r>
+              <a:rPr lang="en-US" baseline="30000" dirty="0"/>
+              <a:t>-1</a:t>
+            </a:r>
+          </a:p>
+          <a:p>
+            <a:pPr lvl="1"/>
+            <a:r>
+              <a:rPr lang="en-US" dirty="0"/>
+              <a:t>O(N</a:t>
+            </a:r>
+            <a:r>
+              <a:rPr lang="en-US" baseline="30000" dirty="0"/>
+              <a:t>3</a:t>
+            </a:r>
+            <a:r>
+              <a:rPr lang="en-US" dirty="0"/>
+              <a:t>) calculation</a:t>
+            </a:r>
+          </a:p>
+          <a:p>
+            <a:pPr lvl="1"/>
+            <a:r>
+              <a:rPr lang="en-US" dirty="0" err="1"/>
+              <a:t>Optimisation</a:t>
+            </a:r>
+            <a:r>
+              <a:rPr lang="en-US" dirty="0"/>
+              <a:t> takes long time if lots of high dim data points</a:t>
+            </a:r>
+          </a:p>
+          <a:p>
+            <a:r>
+              <a:rPr lang="en-US" dirty="0"/>
+              <a:t>FEM models can take very long to run, difficult to get lots/enough data points to fit GP</a:t>
+            </a:r>
+          </a:p>
+          <a:p>
+            <a:pPr marL="0" indent="0">
+              <a:buNone/>
+            </a:pPr>
+            <a:endParaRPr lang="en-US" dirty="0"/>
+          </a:p>
+          <a:p>
+            <a:endParaRPr lang="en-US" dirty="0" err="1"/>
+          </a:p>
+        </p:txBody>
+      </p:sp>
+      <p:sp>
+        <p:nvSpPr>
+          <p:cNvPr id="8" name="Text Placeholder 7">
+            <a:extLst>
+              <a:ext uri="{FF2B5EF4-FFF2-40B4-BE49-F238E27FC236}">
+                <a16:creationId xmlns:a16="http://schemas.microsoft.com/office/drawing/2014/main" id="{100B022F-E9AE-4B49-86B8-C909789DF50A}"/>
+              </a:ext>
+            </a:extLst>
+          </p:cNvPr>
+          <p:cNvSpPr>
+            <a:spLocks noGrp="1"/>
+          </p:cNvSpPr>
+          <p:nvPr>
+            <p:ph type="body" sz="quarter" idx="3"/>
+          </p:nvPr>
+        </p:nvSpPr>
+        <p:spPr/>
+        <p:txBody>
+          <a:bodyPr>
+            <a:normAutofit/>
+          </a:bodyPr>
+          <a:lstStyle/>
+          <a:p>
+            <a:r>
+              <a:rPr lang="en-US" sz="2800" dirty="0"/>
+              <a:t>Solutions</a:t>
+            </a:r>
+          </a:p>
+        </p:txBody>
+      </p:sp>
+      <p:sp>
+        <p:nvSpPr>
+          <p:cNvPr id="9" name="Content Placeholder 8">
+            <a:extLst>
+              <a:ext uri="{FF2B5EF4-FFF2-40B4-BE49-F238E27FC236}">
+                <a16:creationId xmlns:a16="http://schemas.microsoft.com/office/drawing/2014/main" id="{C01A27EB-612F-1A47-AFEA-9BCACBDBA57B}"/>
+              </a:ext>
+            </a:extLst>
+          </p:cNvPr>
+          <p:cNvSpPr>
+            <a:spLocks noGrp="1"/>
+          </p:cNvSpPr>
+          <p:nvPr>
+            <p:ph sz="quarter" idx="4"/>
+          </p:nvPr>
+        </p:nvSpPr>
+        <p:spPr>
+          <a:xfrm>
+            <a:off x="6364224" y="2743199"/>
+            <a:ext cx="4754880" cy="3640975"/>
+          </a:xfrm>
+        </p:spPr>
+        <p:txBody>
+          <a:bodyPr>
+            <a:noAutofit/>
+          </a:bodyPr>
+          <a:lstStyle/>
+          <a:p>
+            <a:r>
+              <a:rPr lang="en-US" dirty="0"/>
+              <a:t>Sparse GP</a:t>
+            </a:r>
+          </a:p>
+          <a:p>
+            <a:pPr lvl="1"/>
+            <a:r>
+              <a:rPr lang="en-US" sz="2000" dirty="0" err="1"/>
+              <a:t>Summarise</a:t>
+            </a:r>
+            <a:r>
+              <a:rPr lang="en-US" sz="2000" dirty="0"/>
+              <a:t> large dataset with a smaller number of pseudo-data</a:t>
+            </a:r>
+          </a:p>
+          <a:p>
+            <a:pPr lvl="1"/>
+            <a:r>
+              <a:rPr lang="en-US" sz="2000" dirty="0"/>
+              <a:t>Reduce complexity to O(N</a:t>
+            </a:r>
+            <a:r>
+              <a:rPr lang="en-US" sz="2000" baseline="30000" dirty="0"/>
+              <a:t>2</a:t>
+            </a:r>
+            <a:r>
+              <a:rPr lang="en-US" sz="2000" dirty="0"/>
+              <a:t>M)</a:t>
+            </a:r>
+          </a:p>
+          <a:p>
+            <a:r>
+              <a:rPr lang="en-US" dirty="0"/>
+              <a:t>Multi-fidelity GP</a:t>
+            </a:r>
+          </a:p>
+          <a:p>
+            <a:pPr lvl="1"/>
+            <a:r>
+              <a:rPr lang="en-US" dirty="0"/>
+              <a:t>Take many samples from cheap to evaluate f</a:t>
+            </a:r>
+            <a:r>
+              <a:rPr lang="en-US" baseline="-25000" dirty="0"/>
+              <a:t>1</a:t>
+            </a:r>
+            <a:r>
+              <a:rPr lang="en-US" dirty="0"/>
+              <a:t>(x) and few samples from expensive f</a:t>
+            </a:r>
+            <a:r>
+              <a:rPr lang="en-US" baseline="-25000" dirty="0"/>
+              <a:t>2</a:t>
+            </a:r>
+            <a:r>
+              <a:rPr lang="en-US" dirty="0"/>
+              <a:t>(x)</a:t>
+            </a:r>
+          </a:p>
+          <a:p>
+            <a:pPr lvl="1"/>
+            <a:r>
+              <a:rPr lang="en-US" dirty="0"/>
+              <a:t>Combined training and prediction to get better estimation of high-fidelity f</a:t>
+            </a:r>
+            <a:r>
+              <a:rPr lang="en-US" baseline="-25000" dirty="0"/>
+              <a:t>2</a:t>
+            </a:r>
+            <a:r>
+              <a:rPr lang="en-US" dirty="0"/>
+              <a:t>(x)</a:t>
+            </a:r>
+          </a:p>
+        </p:txBody>
+      </p:sp>
+      <p:sp>
+        <p:nvSpPr>
+          <p:cNvPr id="2" name="Title 1">
+            <a:extLst>
+              <a:ext uri="{FF2B5EF4-FFF2-40B4-BE49-F238E27FC236}">
+                <a16:creationId xmlns:a16="http://schemas.microsoft.com/office/drawing/2014/main" id="{DC4FC240-EBD0-2644-8BF3-9B5428807654}"/>
+              </a:ext>
+            </a:extLst>
+          </p:cNvPr>
+          <p:cNvSpPr>
+            <a:spLocks noGrp="1"/>
+          </p:cNvSpPr>
+          <p:nvPr>
+            <p:ph type="title"/>
+          </p:nvPr>
+        </p:nvSpPr>
+        <p:spPr/>
+        <p:txBody>
+          <a:bodyPr/>
+          <a:lstStyle/>
+          <a:p>
+            <a:r>
+              <a:rPr lang="en-GB" dirty="0"/>
+              <a:t>improving</a:t>
+            </a:r>
+            <a:r>
+              <a:rPr lang="en-US" dirty="0"/>
+              <a:t> the </a:t>
+            </a:r>
+            <a:r>
+              <a:rPr lang="en-GB" dirty="0"/>
+              <a:t>Optimisation</a:t>
+            </a:r>
+          </a:p>
+        </p:txBody>
+      </p:sp>
+    </p:spTree>
+    <p:extLst>
+      <p:ext uri="{BB962C8B-B14F-4D97-AF65-F5344CB8AC3E}">
+        <p14:creationId xmlns:p14="http://schemas.microsoft.com/office/powerpoint/2010/main" val="1604994096"/>
       </p:ext>
     </p:extLst>
   </p:cSld>
@@ -9342,7 +9651,7 @@
       </p:grpSpPr>
       <p:sp>
         <p:nvSpPr>
-          <p:cNvPr id="7" name="Rounded Rectangle 11">
+          <p:cNvPr id="1028" name="Rounded Rectangle 11">
             <a:extLst>
               <a:ext uri="{FF2B5EF4-FFF2-40B4-BE49-F238E27FC236}">
                 <a16:creationId xmlns:a16="http://schemas.microsoft.com/office/drawing/2014/main" id="{2770B5F4-AED0-4A3A-859D-B6239ED38A3B}"/>
@@ -9412,42 +9721,59 @@
       </p:sp>
       <p:pic>
         <p:nvPicPr>
-          <p:cNvPr id="2" name="Picture 1" descr="Chart, line chart&#10;&#10;Description automatically generated">
+          <p:cNvPr id="1026" name="Picture 2" descr="PDF] Online Sparse Gaussian Process Training with Input Noise | Semantic  Scholar">
             <a:hlinkClick r:id="rId3"/>
             <a:extLst>
               <a:ext uri="{FF2B5EF4-FFF2-40B4-BE49-F238E27FC236}">
-                <a16:creationId xmlns:a16="http://schemas.microsoft.com/office/drawing/2014/main" id="{4501EB8F-B88A-BF4B-BEF9-A1AE2E490EEF}"/>
+                <a16:creationId xmlns:a16="http://schemas.microsoft.com/office/drawing/2014/main" id="{CC18E571-DA11-2940-B9B8-9DBFABABAC89}"/>
               </a:ext>
             </a:extLst>
           </p:cNvPr>
           <p:cNvPicPr>
-            <a:picLocks noChangeAspect="1"/>
+            <a:picLocks noChangeAspect="1" noChangeArrowheads="1"/>
           </p:cNvPicPr>
           <p:nvPr/>
         </p:nvPicPr>
-        <p:blipFill rotWithShape="1">
-          <a:blip r:embed="rId4"/>
-          <a:srcRect t="5273"/>
-          <a:stretch/>
+        <p:blipFill>
+          <a:blip r:embed="rId4">
+            <a:extLst>
+              <a:ext uri="{28A0092B-C50C-407E-A947-70E740481C1C}">
+                <a14:useLocalDpi xmlns:a14="http://schemas.microsoft.com/office/drawing/2010/main" val="0"/>
+              </a:ext>
+            </a:extLst>
+          </a:blip>
+          <a:stretch>
+            <a:fillRect/>
+          </a:stretch>
         </p:blipFill>
-        <p:spPr>
-          <a:xfrm>
-            <a:off x="1363131" y="873252"/>
-            <a:ext cx="9465738" cy="5111496"/>
+        <p:spPr bwMode="auto">
+          <a:xfrm>
+            <a:off x="870204" y="1443197"/>
+            <a:ext cx="10451592" cy="3971605"/>
           </a:xfrm>
           <a:prstGeom prst="rect">
             <a:avLst/>
           </a:prstGeom>
+          <a:noFill/>
           <a:ln w="31750" cap="sq">
             <a:noFill/>
             <a:miter lim="800000"/>
           </a:ln>
+          <a:extLst>
+            <a:ext uri="{909E8E84-426E-40DD-AFC4-6F175D3DCCD1}">
+              <a14:hiddenFill xmlns:a14="http://schemas.microsoft.com/office/drawing/2010/main">
+                <a:solidFill>
+                  <a:srgbClr val="FFFFFF"/>
+                </a:solidFill>
+              </a14:hiddenFill>
+            </a:ext>
+          </a:extLst>
         </p:spPr>
       </p:pic>
     </p:spTree>
     <p:extLst>
       <p:ext uri="{BB962C8B-B14F-4D97-AF65-F5344CB8AC3E}">
-        <p14:creationId xmlns:p14="http://schemas.microsoft.com/office/powerpoint/2010/main" val="1153423290"/>
+        <p14:creationId xmlns:p14="http://schemas.microsoft.com/office/powerpoint/2010/main" val="698118470"/>
       </p:ext>
     </p:extLst>
   </p:cSld>

</xml_diff>